<commit_message>
Worked on the poster a bit
</commit_message>
<xml_diff>
--- a/Breadbox Poster.pptx
+++ b/Breadbox Poster.pptx
@@ -6508,7 +6508,7 @@
           </a:ln>
           <a:extLst>
             <a:ext uri="{C572A759-6A51-4108-AA02-DFA0A04FC94B}">
-              <ma14:wrappingTextBoxFlag xmlns:ma14="http://schemas.microsoft.com/office/mac/drawingml/2011/main" xmlns:a14="http://schemas.microsoft.com/office/drawing/2010/main" xmlns:m="http://schemas.openxmlformats.org/officeDocument/2006/math" xmlns="" val="1"/>
+              <ma14:wrappingTextBoxFlag xmlns="" xmlns:m="http://schemas.openxmlformats.org/officeDocument/2006/math" xmlns:a14="http://schemas.microsoft.com/office/drawing/2010/main" xmlns:ma14="http://schemas.microsoft.com/office/mac/drawingml/2011/main" val="1"/>
             </a:ext>
           </a:extLst>
         </p:spPr>
@@ -6545,7 +6545,7 @@
           </a:ln>
           <a:extLst>
             <a:ext uri="{C572A759-6A51-4108-AA02-DFA0A04FC94B}">
-              <ma14:wrappingTextBoxFlag xmlns:ma14="http://schemas.microsoft.com/office/mac/drawingml/2011/main" xmlns:a14="http://schemas.microsoft.com/office/drawing/2010/main" xmlns:m="http://schemas.openxmlformats.org/officeDocument/2006/math" xmlns="" val="1"/>
+              <ma14:wrappingTextBoxFlag xmlns="" xmlns:m="http://schemas.openxmlformats.org/officeDocument/2006/math" xmlns:a14="http://schemas.microsoft.com/office/drawing/2010/main" xmlns:ma14="http://schemas.microsoft.com/office/mac/drawingml/2011/main" val="1"/>
             </a:ext>
           </a:extLst>
         </p:spPr>
@@ -7555,7 +7555,7 @@
             <a:effectLst/>
             <a:extLst>
               <a:ext uri="{C572A759-6A51-4108-AA02-DFA0A04FC94B}">
-                <ma14:wrappingTextBoxFlag xmlns:ma14="http://schemas.microsoft.com/office/mac/drawingml/2011/main" xmlns:a14="http://schemas.microsoft.com/office/drawing/2010/main" xmlns:m="http://schemas.openxmlformats.org/officeDocument/2006/math" xmlns="" val="1"/>
+                <ma14:wrappingTextBoxFlag xmlns="" xmlns:m="http://schemas.openxmlformats.org/officeDocument/2006/math" xmlns:a14="http://schemas.microsoft.com/office/drawing/2010/main" xmlns:ma14="http://schemas.microsoft.com/office/mac/drawingml/2011/main" val="1"/>
               </a:ext>
             </a:extLst>
           </p:spPr>
@@ -7594,7 +7594,7 @@
         </p:nvGrpSpPr>
         <p:grpSpPr>
           <a:xfrm>
-            <a:off x="571603" y="15853500"/>
+            <a:off x="571605" y="15131292"/>
             <a:ext cx="6364678" cy="660542"/>
             <a:chOff x="0" y="-45166"/>
             <a:chExt cx="6364677" cy="660540"/>
@@ -7666,7 +7666,7 @@
             <a:effectLst/>
             <a:extLst>
               <a:ext uri="{C572A759-6A51-4108-AA02-DFA0A04FC94B}">
-                <ma14:wrappingTextBoxFlag xmlns:ma14="http://schemas.microsoft.com/office/mac/drawingml/2011/main" xmlns:a14="http://schemas.microsoft.com/office/drawing/2010/main" xmlns:m="http://schemas.openxmlformats.org/officeDocument/2006/math" xmlns="" val="1"/>
+                <ma14:wrappingTextBoxFlag xmlns="" xmlns:m="http://schemas.openxmlformats.org/officeDocument/2006/math" xmlns:a14="http://schemas.microsoft.com/office/drawing/2010/main" xmlns:ma14="http://schemas.microsoft.com/office/mac/drawingml/2011/main" val="1"/>
               </a:ext>
             </a:extLst>
           </p:spPr>
@@ -7777,7 +7777,7 @@
             <a:effectLst/>
             <a:extLst>
               <a:ext uri="{C572A759-6A51-4108-AA02-DFA0A04FC94B}">
-                <ma14:wrappingTextBoxFlag xmlns:ma14="http://schemas.microsoft.com/office/mac/drawingml/2011/main" xmlns:a14="http://schemas.microsoft.com/office/drawing/2010/main" xmlns:m="http://schemas.openxmlformats.org/officeDocument/2006/math" xmlns="" val="1"/>
+                <ma14:wrappingTextBoxFlag xmlns="" xmlns:m="http://schemas.openxmlformats.org/officeDocument/2006/math" xmlns:a14="http://schemas.microsoft.com/office/drawing/2010/main" xmlns:ma14="http://schemas.microsoft.com/office/mac/drawingml/2011/main" val="1"/>
               </a:ext>
             </a:extLst>
           </p:spPr>
@@ -7888,7 +7888,7 @@
             <a:effectLst/>
             <a:extLst>
               <a:ext uri="{C572A759-6A51-4108-AA02-DFA0A04FC94B}">
-                <ma14:wrappingTextBoxFlag xmlns:ma14="http://schemas.microsoft.com/office/mac/drawingml/2011/main" xmlns:a14="http://schemas.microsoft.com/office/drawing/2010/main" xmlns:m="http://schemas.openxmlformats.org/officeDocument/2006/math" xmlns="" val="1"/>
+                <ma14:wrappingTextBoxFlag xmlns="" xmlns:m="http://schemas.openxmlformats.org/officeDocument/2006/math" xmlns:a14="http://schemas.microsoft.com/office/drawing/2010/main" xmlns:ma14="http://schemas.microsoft.com/office/mac/drawingml/2011/main" val="1"/>
               </a:ext>
             </a:extLst>
           </p:spPr>
@@ -7999,7 +7999,7 @@
             <a:effectLst/>
             <a:extLst>
               <a:ext uri="{C572A759-6A51-4108-AA02-DFA0A04FC94B}">
-                <ma14:wrappingTextBoxFlag xmlns:ma14="http://schemas.microsoft.com/office/mac/drawingml/2011/main" xmlns:a14="http://schemas.microsoft.com/office/drawing/2010/main" xmlns:m="http://schemas.openxmlformats.org/officeDocument/2006/math" xmlns="" val="1"/>
+                <ma14:wrappingTextBoxFlag xmlns="" xmlns:m="http://schemas.openxmlformats.org/officeDocument/2006/math" xmlns:a14="http://schemas.microsoft.com/office/drawing/2010/main" xmlns:ma14="http://schemas.microsoft.com/office/mac/drawingml/2011/main" val="1"/>
               </a:ext>
             </a:extLst>
           </p:spPr>
@@ -8054,7 +8054,7 @@
           </a:ln>
           <a:extLst>
             <a:ext uri="{C572A759-6A51-4108-AA02-DFA0A04FC94B}">
-              <ma14:wrappingTextBoxFlag xmlns:ma14="http://schemas.microsoft.com/office/mac/drawingml/2011/main" xmlns:a14="http://schemas.microsoft.com/office/drawing/2010/main" xmlns:m="http://schemas.openxmlformats.org/officeDocument/2006/math" xmlns="" val="1"/>
+              <ma14:wrappingTextBoxFlag xmlns="" xmlns:m="http://schemas.openxmlformats.org/officeDocument/2006/math" xmlns:a14="http://schemas.microsoft.com/office/drawing/2010/main" xmlns:ma14="http://schemas.microsoft.com/office/mac/drawingml/2011/main" val="1"/>
             </a:ext>
           </a:extLst>
         </p:spPr>
@@ -8805,7 +8805,7 @@
           </a:ln>
           <a:extLst>
             <a:ext uri="{C572A759-6A51-4108-AA02-DFA0A04FC94B}">
-              <ma14:wrappingTextBoxFlag xmlns:ma14="http://schemas.microsoft.com/office/mac/drawingml/2011/main" xmlns:a14="http://schemas.microsoft.com/office/drawing/2010/main" xmlns:m="http://schemas.openxmlformats.org/officeDocument/2006/math" xmlns="" val="1"/>
+              <ma14:wrappingTextBoxFlag xmlns="" xmlns:m="http://schemas.openxmlformats.org/officeDocument/2006/math" xmlns:a14="http://schemas.microsoft.com/office/drawing/2010/main" xmlns:ma14="http://schemas.microsoft.com/office/mac/drawingml/2011/main" val="1"/>
             </a:ext>
           </a:extLst>
         </p:spPr>
@@ -9692,7 +9692,7 @@
         <p:spPr>
           <a:xfrm>
             <a:off x="571605" y="6342658"/>
-            <a:ext cx="6364677" cy="7062295"/>
+            <a:ext cx="6364677" cy="4107640"/>
           </a:xfrm>
           <a:prstGeom prst="rect">
             <a:avLst/>
@@ -9707,7 +9707,7 @@
           </a:ln>
           <a:extLst>
             <a:ext uri="{C572A759-6A51-4108-AA02-DFA0A04FC94B}">
-              <ma14:wrappingTextBoxFlag xmlns:ma14="http://schemas.microsoft.com/office/mac/drawingml/2011/main" xmlns:a14="http://schemas.microsoft.com/office/drawing/2010/main" xmlns:m="http://schemas.openxmlformats.org/officeDocument/2006/math" xmlns="" val="1"/>
+              <ma14:wrappingTextBoxFlag xmlns="" xmlns:m="http://schemas.openxmlformats.org/officeDocument/2006/math" xmlns:a14="http://schemas.microsoft.com/office/drawing/2010/main" xmlns:ma14="http://schemas.microsoft.com/office/mac/drawingml/2011/main" val="1"/>
             </a:ext>
           </a:extLst>
         </p:spPr>
@@ -9727,38 +9727,8 @@
             </a:pPr>
             <a:r>
               <a:rPr lang="en-GB" sz="2400" dirty="0"/>
-              <a:t>Created to address and help the mental health of students at RGU, Echo originally provided resources to help engineering and computing students but is now open to everyone who needs it. Echo provides exercises designed to help students, such as breathing exercises, and also provides help for other issues ranging from anxiety and depression to issues with addiction or problems with sleep. There are also pages about counselling, and contacts for help. </a:t>
-            </a:r>
-          </a:p>
-          <a:p>
-            <a:pPr algn="just">
-              <a:defRPr sz="2400">
-                <a:latin typeface="Arial"/>
-                <a:ea typeface="Arial"/>
-                <a:cs typeface="Arial"/>
-                <a:sym typeface="Arial"/>
-              </a:defRPr>
-            </a:pPr>
-            <a:endParaRPr lang="en-GB" sz="2400" dirty="0"/>
-          </a:p>
-          <a:p>
-            <a:pPr algn="just">
-              <a:defRPr sz="2400">
-                <a:latin typeface="Arial"/>
-                <a:ea typeface="Arial"/>
-                <a:cs typeface="Arial"/>
-                <a:sym typeface="Arial"/>
-              </a:defRPr>
-            </a:pPr>
-            <a:r>
-              <a:rPr lang="en-GB" sz="2400" dirty="0"/>
-              <a:t>The project is still in its early stages though, and Jo is looking to continue expanding the app. Among the ideas presented for expanding and improving the site, the accessibility of it as well as its security stood out as the most important things that we should be looking at to tackle</a:t>
-            </a:r>
-            <a:r>
-              <a:rPr lang="en-GB" sz="2400"/>
-              <a:t>. </a:t>
-            </a:r>
-            <a:endParaRPr lang="en-GB" sz="2400" dirty="0"/>
+              <a:t>Created to address and help the mental health of students at RGU, Echo originally provided resources to help engineering and computing students but is now open to everyone who needs it. Echo provides exercises designed to help students, such as breathing exercises, and provides help for other issues ranging from anxiety and depression to issues with addiction or problems with sleep. There are also pages about counselling, and contacts for help. </a:t>
+            </a:r>
           </a:p>
         </p:txBody>
       </p:sp>
@@ -9770,8 +9740,8 @@
         </p:nvSpPr>
         <p:spPr>
           <a:xfrm>
-            <a:off x="571605" y="16745126"/>
-            <a:ext cx="6364677" cy="6323631"/>
+            <a:off x="623302" y="16226329"/>
+            <a:ext cx="6364677" cy="4476972"/>
           </a:xfrm>
           <a:prstGeom prst="rect">
             <a:avLst/>
@@ -9786,7 +9756,7 @@
           </a:ln>
           <a:extLst>
             <a:ext uri="{C572A759-6A51-4108-AA02-DFA0A04FC94B}">
-              <ma14:wrappingTextBoxFlag xmlns:ma14="http://schemas.microsoft.com/office/mac/drawingml/2011/main" xmlns:a14="http://schemas.microsoft.com/office/drawing/2010/main" xmlns:m="http://schemas.openxmlformats.org/officeDocument/2006/math" xmlns="" val="1"/>
+              <ma14:wrappingTextBoxFlag xmlns="" xmlns:m="http://schemas.openxmlformats.org/officeDocument/2006/math" xmlns:a14="http://schemas.microsoft.com/office/drawing/2010/main" xmlns:ma14="http://schemas.microsoft.com/office/mac/drawingml/2011/main" val="1"/>
             </a:ext>
           </a:extLst>
         </p:spPr>
@@ -9807,573 +9777,20 @@
           <a:p>
             <a:pPr algn="just"/>
             <a:r>
-              <a:rPr dirty="0"/>
-              <a:t>Ga. </a:t>
-            </a:r>
-            <a:r>
-              <a:rPr dirty="0" err="1"/>
-              <a:t>Oviduntusam</a:t>
-            </a:r>
-            <a:r>
-              <a:rPr dirty="0"/>
-              <a:t> </a:t>
-            </a:r>
-            <a:r>
-              <a:rPr dirty="0" err="1"/>
-              <a:t>exerum</a:t>
-            </a:r>
-            <a:r>
-              <a:rPr dirty="0"/>
-              <a:t> </a:t>
-            </a:r>
-            <a:r>
-              <a:rPr dirty="0" err="1"/>
-              <a:t>fugitat</a:t>
-            </a:r>
-            <a:r>
-              <a:rPr dirty="0"/>
-              <a:t> </a:t>
-            </a:r>
-            <a:r>
-              <a:rPr dirty="0" err="1"/>
-              <a:t>quae</a:t>
-            </a:r>
-            <a:r>
-              <a:rPr dirty="0"/>
-              <a:t> </a:t>
-            </a:r>
-            <a:r>
-              <a:rPr dirty="0" err="1"/>
-              <a:t>el</a:t>
-            </a:r>
-            <a:r>
-              <a:rPr dirty="0"/>
-              <a:t> </a:t>
-            </a:r>
-            <a:r>
-              <a:rPr dirty="0" err="1"/>
-              <a:t>exersperum</a:t>
-            </a:r>
-            <a:r>
-              <a:rPr dirty="0"/>
-              <a:t> qui </a:t>
-            </a:r>
-            <a:r>
-              <a:rPr dirty="0" err="1"/>
-              <a:t>corum</a:t>
-            </a:r>
-            <a:r>
-              <a:rPr dirty="0"/>
-              <a:t> </a:t>
-            </a:r>
-            <a:r>
-              <a:rPr dirty="0" err="1"/>
-              <a:t>sam</a:t>
-            </a:r>
-            <a:r>
-              <a:rPr dirty="0"/>
-              <a:t> </a:t>
-            </a:r>
-            <a:r>
-              <a:rPr dirty="0" err="1"/>
-              <a:t>sitas</a:t>
-            </a:r>
-            <a:r>
-              <a:rPr dirty="0"/>
-              <a:t> que </a:t>
-            </a:r>
-            <a:r>
-              <a:rPr dirty="0" err="1"/>
-              <a:t>officiat</a:t>
-            </a:r>
-            <a:r>
-              <a:rPr dirty="0"/>
-              <a:t> am </a:t>
-            </a:r>
-            <a:r>
-              <a:rPr dirty="0" err="1"/>
-              <a:t>el</a:t>
-            </a:r>
-            <a:r>
-              <a:rPr dirty="0"/>
-              <a:t> </a:t>
-            </a:r>
-            <a:r>
-              <a:rPr dirty="0" err="1"/>
-              <a:t>inust</a:t>
-            </a:r>
-            <a:r>
-              <a:rPr dirty="0"/>
-              <a:t> </a:t>
-            </a:r>
-            <a:r>
-              <a:rPr dirty="0" err="1"/>
-              <a:t>dunt</a:t>
-            </a:r>
-            <a:r>
-              <a:rPr dirty="0"/>
-              <a:t> mint </a:t>
-            </a:r>
-            <a:r>
-              <a:rPr dirty="0" err="1"/>
-              <a:t>ut</a:t>
-            </a:r>
-            <a:r>
-              <a:rPr dirty="0"/>
-              <a:t> vel il </a:t>
-            </a:r>
-            <a:r>
-              <a:rPr dirty="0" err="1"/>
-              <a:t>mintis</a:t>
-            </a:r>
-            <a:r>
-              <a:rPr dirty="0"/>
-              <a:t> es vel maxim </a:t>
-            </a:r>
-            <a:r>
-              <a:rPr dirty="0" err="1"/>
-              <a:t>dolupiet</a:t>
-            </a:r>
-            <a:r>
-              <a:rPr dirty="0"/>
-              <a:t>, </a:t>
-            </a:r>
-            <a:r>
-              <a:rPr dirty="0" err="1"/>
-              <a:t>aut</a:t>
-            </a:r>
-            <a:r>
-              <a:rPr dirty="0"/>
-              <a:t> </a:t>
-            </a:r>
-            <a:r>
-              <a:rPr dirty="0" err="1"/>
-              <a:t>quatur</a:t>
-            </a:r>
-            <a:r>
-              <a:rPr dirty="0"/>
-              <a:t> </a:t>
-            </a:r>
-            <a:r>
-              <a:rPr dirty="0" err="1"/>
-              <a:t>aborem</a:t>
-            </a:r>
-            <a:r>
-              <a:rPr dirty="0"/>
-              <a:t> </a:t>
-            </a:r>
-            <a:r>
-              <a:rPr dirty="0" err="1"/>
-              <a:t>quiae</a:t>
-            </a:r>
-            <a:r>
-              <a:rPr dirty="0"/>
-              <a:t> </a:t>
-            </a:r>
-            <a:r>
-              <a:rPr dirty="0" err="1"/>
-              <a:t>explitatur</a:t>
-            </a:r>
-            <a:r>
-              <a:rPr dirty="0"/>
-              <a:t> sum </a:t>
-            </a:r>
-            <a:r>
-              <a:rPr dirty="0" err="1"/>
-              <a:t>venihit</a:t>
-            </a:r>
-            <a:r>
-              <a:rPr dirty="0"/>
-              <a:t> quo con </a:t>
-            </a:r>
-            <a:r>
-              <a:rPr dirty="0" err="1"/>
-              <a:t>cusda</a:t>
-            </a:r>
-            <a:r>
-              <a:rPr dirty="0"/>
-              <a:t> </a:t>
-            </a:r>
-            <a:r>
-              <a:rPr dirty="0" err="1"/>
-              <a:t>volorum</a:t>
-            </a:r>
-            <a:r>
-              <a:rPr dirty="0"/>
-              <a:t> </a:t>
-            </a:r>
-            <a:r>
-              <a:rPr dirty="0" err="1"/>
-              <a:t>quia</a:t>
-            </a:r>
-            <a:r>
-              <a:rPr dirty="0"/>
-              <a:t> qui </a:t>
-            </a:r>
-            <a:r>
-              <a:rPr dirty="0" err="1"/>
-              <a:t>conessunt</a:t>
-            </a:r>
-            <a:r>
-              <a:rPr dirty="0"/>
-              <a:t> vel </a:t>
-            </a:r>
-            <a:r>
-              <a:rPr dirty="0" err="1"/>
-              <a:t>etur</a:t>
-            </a:r>
-            <a:r>
-              <a:rPr dirty="0"/>
-              <a:t>? </a:t>
-            </a:r>
-            <a:r>
-              <a:rPr dirty="0" err="1"/>
-              <a:t>Quis</a:t>
-            </a:r>
-            <a:r>
-              <a:rPr dirty="0"/>
-              <a:t> </a:t>
-            </a:r>
-            <a:r>
-              <a:rPr dirty="0" err="1"/>
-              <a:t>nullitae</a:t>
-            </a:r>
-            <a:r>
-              <a:rPr dirty="0"/>
-              <a:t> </a:t>
-            </a:r>
-            <a:r>
-              <a:rPr dirty="0" err="1"/>
-              <a:t>porunto</a:t>
-            </a:r>
-            <a:r>
-              <a:rPr dirty="0"/>
-              <a:t> mod </a:t>
-            </a:r>
-            <a:r>
-              <a:rPr dirty="0" err="1"/>
-              <a:t>maiorio</a:t>
-            </a:r>
-            <a:r>
-              <a:rPr dirty="0"/>
-              <a:t> ex es </a:t>
-            </a:r>
-            <a:r>
-              <a:rPr dirty="0" err="1"/>
-              <a:t>dolupis</a:t>
-            </a:r>
-            <a:r>
-              <a:rPr dirty="0"/>
-              <a:t> </a:t>
-            </a:r>
-            <a:r>
-              <a:rPr dirty="0" err="1"/>
-              <a:t>eum</a:t>
-            </a:r>
-            <a:endParaRPr lang="en-GB" dirty="0"/>
+              <a:rPr lang="en-GB" dirty="0"/>
+              <a:t>Once we had agreed upon the areas we should be focusing on, we conducted research on accessibility features as well as cyber security before coming together and developing a prototype of what these new features could look like. </a:t>
+            </a:r>
+            <a:endParaRPr lang="en-GB" sz="2400" dirty="0"/>
           </a:p>
           <a:p>
             <a:pPr algn="just"/>
             <a:endParaRPr lang="en-GB" dirty="0"/>
           </a:p>
           <a:p>
-            <a:pPr algn="just">
-              <a:defRPr sz="2400">
-                <a:latin typeface="Arial"/>
-                <a:ea typeface="Arial"/>
-                <a:cs typeface="Arial"/>
-                <a:sym typeface="Arial"/>
-              </a:defRPr>
-            </a:pPr>
-            <a:r>
-              <a:rPr lang="en-GB" sz="2400" dirty="0" err="1"/>
-              <a:t>Ugiatempore</a:t>
-            </a:r>
-            <a:r>
-              <a:rPr lang="en-GB" sz="2400" dirty="0"/>
-              <a:t> </a:t>
-            </a:r>
-            <a:r>
-              <a:rPr lang="en-GB" sz="2400" dirty="0" err="1"/>
-              <a:t>evenis</a:t>
-            </a:r>
-            <a:r>
-              <a:rPr lang="en-GB" sz="2400" dirty="0"/>
-              <a:t> </a:t>
-            </a:r>
-            <a:r>
-              <a:rPr lang="en-GB" sz="2400" dirty="0" err="1"/>
-              <a:t>rae</a:t>
-            </a:r>
-            <a:r>
-              <a:rPr lang="en-GB" sz="2400" dirty="0"/>
-              <a:t> </a:t>
-            </a:r>
-            <a:r>
-              <a:rPr lang="en-GB" sz="2400" dirty="0" err="1"/>
-              <a:t>doluptatum</a:t>
-            </a:r>
-            <a:r>
-              <a:rPr lang="en-GB" sz="2400" dirty="0"/>
-              <a:t> </a:t>
-            </a:r>
-            <a:r>
-              <a:rPr lang="en-GB" sz="2400" dirty="0" err="1"/>
-              <a:t>fugiam</a:t>
-            </a:r>
-            <a:r>
-              <a:rPr lang="en-GB" sz="2400" dirty="0"/>
-              <a:t> </a:t>
-            </a:r>
-            <a:r>
-              <a:rPr lang="en-GB" sz="2400" dirty="0" err="1"/>
-              <a:t>earchitiam</a:t>
-            </a:r>
-            <a:r>
-              <a:rPr lang="en-GB" sz="2400" dirty="0"/>
-              <a:t> </a:t>
-            </a:r>
-            <a:r>
-              <a:rPr lang="en-GB" sz="2400" dirty="0" err="1"/>
-              <a:t>dit</a:t>
-            </a:r>
-            <a:r>
-              <a:rPr lang="en-GB" sz="2400" dirty="0"/>
-              <a:t>, </a:t>
-            </a:r>
-            <a:r>
-              <a:rPr lang="en-GB" sz="2400" dirty="0" err="1"/>
-              <a:t>tempe</a:t>
-            </a:r>
-            <a:r>
-              <a:rPr lang="en-GB" sz="2400" dirty="0"/>
-              <a:t> </a:t>
-            </a:r>
-            <a:r>
-              <a:rPr lang="en-GB" sz="2400" dirty="0" err="1"/>
-              <a:t>susdam</a:t>
-            </a:r>
-            <a:r>
-              <a:rPr lang="en-GB" sz="2400" dirty="0"/>
-              <a:t> qui </a:t>
-            </a:r>
-            <a:r>
-              <a:rPr lang="en-GB" sz="2400" dirty="0" err="1"/>
-              <a:t>asimin</a:t>
-            </a:r>
-            <a:r>
-              <a:rPr lang="en-GB" sz="2400" dirty="0"/>
-              <a:t> et </a:t>
-            </a:r>
-            <a:r>
-              <a:rPr lang="en-GB" sz="2400" dirty="0" err="1"/>
-              <a:t>quissequam</a:t>
-            </a:r>
-            <a:r>
-              <a:rPr lang="en-GB" sz="2400" dirty="0"/>
-              <a:t> la </a:t>
-            </a:r>
-            <a:r>
-              <a:rPr lang="en-GB" sz="2400" dirty="0" err="1"/>
-              <a:t>ni</a:t>
-            </a:r>
-            <a:r>
-              <a:rPr lang="en-GB" sz="2400" dirty="0"/>
-              <a:t> </a:t>
-            </a:r>
-            <a:r>
-              <a:rPr lang="en-GB" sz="2400" dirty="0" err="1"/>
-              <a:t>ipsunt</a:t>
-            </a:r>
-            <a:r>
-              <a:rPr lang="en-GB" sz="2400" dirty="0"/>
-              <a:t>.</a:t>
-            </a:r>
-          </a:p>
-          <a:p>
-            <a:pPr algn="just">
-              <a:defRPr sz="2400">
-                <a:latin typeface="Arial"/>
-                <a:ea typeface="Arial"/>
-                <a:cs typeface="Arial"/>
-                <a:sym typeface="Arial"/>
-              </a:defRPr>
-            </a:pPr>
-            <a:r>
-              <a:rPr lang="en-GB" sz="2400" dirty="0" err="1"/>
-              <a:t>Ditat</a:t>
-            </a:r>
-            <a:r>
-              <a:rPr lang="en-GB" sz="2400" dirty="0"/>
-              <a:t> que a </a:t>
-            </a:r>
-            <a:r>
-              <a:rPr lang="en-GB" sz="2400" dirty="0" err="1"/>
-              <a:t>quibus</a:t>
-            </a:r>
-            <a:r>
-              <a:rPr lang="en-GB" sz="2400" dirty="0"/>
-              <a:t> </a:t>
-            </a:r>
-            <a:r>
-              <a:rPr lang="en-GB" sz="2400" dirty="0" err="1"/>
-              <a:t>dolutatur</a:t>
-            </a:r>
-            <a:r>
-              <a:rPr lang="en-GB" sz="2400" dirty="0"/>
-              <a:t> </a:t>
-            </a:r>
-            <a:r>
-              <a:rPr lang="en-GB" sz="2400" dirty="0" err="1"/>
-              <a:t>sedit</a:t>
-            </a:r>
-            <a:r>
-              <a:rPr lang="en-GB" sz="2400" dirty="0"/>
-              <a:t> </a:t>
-            </a:r>
-            <a:r>
-              <a:rPr lang="en-GB" sz="2400" dirty="0" err="1"/>
-              <a:t>aliam</a:t>
-            </a:r>
-            <a:r>
-              <a:rPr lang="en-GB" sz="2400" dirty="0"/>
-              <a:t> </a:t>
-            </a:r>
-            <a:r>
-              <a:rPr lang="en-GB" sz="2400" dirty="0" err="1"/>
-              <a:t>apienda</a:t>
-            </a:r>
-            <a:r>
-              <a:rPr lang="en-GB" sz="2400" dirty="0"/>
-              <a:t> </a:t>
-            </a:r>
-            <a:r>
-              <a:rPr lang="en-GB" sz="2400" dirty="0" err="1"/>
-              <a:t>versper</a:t>
-            </a:r>
-            <a:r>
-              <a:rPr lang="en-GB" sz="2400" dirty="0"/>
-              <a:t> </a:t>
-            </a:r>
-            <a:r>
-              <a:rPr lang="en-GB" sz="2400" dirty="0" err="1"/>
-              <a:t>feriti</a:t>
-            </a:r>
-            <a:r>
-              <a:rPr lang="en-GB" sz="2400" dirty="0"/>
-              <a:t> </a:t>
-            </a:r>
-            <a:r>
-              <a:rPr lang="en-GB" sz="2400" dirty="0" err="1"/>
-              <a:t>delia</a:t>
-            </a:r>
-            <a:r>
-              <a:rPr lang="en-GB" sz="2400" dirty="0"/>
-              <a:t> pa </a:t>
-            </a:r>
-            <a:r>
-              <a:rPr lang="en-GB" sz="2400" dirty="0" err="1"/>
-              <a:t>dolo</a:t>
-            </a:r>
-            <a:r>
-              <a:rPr lang="en-GB" sz="2400" dirty="0"/>
-              <a:t> </a:t>
-            </a:r>
-            <a:r>
-              <a:rPr lang="en-GB" sz="2400" dirty="0" err="1"/>
-              <a:t>quamus</a:t>
-            </a:r>
-            <a:r>
-              <a:rPr lang="en-GB" sz="2400" dirty="0"/>
-              <a:t> arum es </a:t>
-            </a:r>
-            <a:r>
-              <a:rPr lang="en-GB" sz="2400" dirty="0" err="1"/>
-              <a:t>endellu</a:t>
-            </a:r>
-            <a:r>
-              <a:rPr lang="en-GB" sz="2400" dirty="0"/>
-              <a:t> </a:t>
-            </a:r>
-            <a:r>
-              <a:rPr lang="en-GB" sz="2400" dirty="0" err="1"/>
-              <a:t>pisquia</a:t>
-            </a:r>
-            <a:r>
-              <a:rPr lang="en-GB" sz="2400" dirty="0"/>
-              <a:t> </a:t>
-            </a:r>
-            <a:r>
-              <a:rPr lang="en-GB" sz="2400" dirty="0" err="1"/>
-              <a:t>aditatur</a:t>
-            </a:r>
-            <a:r>
-              <a:rPr lang="en-GB" sz="2400" dirty="0"/>
-              <a:t> </a:t>
-            </a:r>
-            <a:r>
-              <a:rPr lang="en-GB" sz="2400" dirty="0" err="1"/>
-              <a:t>audam</a:t>
-            </a:r>
-            <a:r>
-              <a:rPr lang="en-GB" sz="2400" dirty="0"/>
-              <a:t> </a:t>
-            </a:r>
-            <a:r>
-              <a:rPr lang="en-GB" sz="2400" dirty="0" err="1"/>
-              <a:t>earupid</a:t>
-            </a:r>
-            <a:r>
-              <a:rPr lang="en-GB" sz="2400" dirty="0"/>
-              <a:t> quo </a:t>
-            </a:r>
-            <a:r>
-              <a:rPr lang="en-GB" sz="2400" dirty="0" err="1"/>
-              <a:t>quunt</a:t>
-            </a:r>
-            <a:r>
-              <a:rPr lang="en-GB" sz="2400" dirty="0"/>
-              <a:t> </a:t>
-            </a:r>
-            <a:r>
-              <a:rPr lang="en-GB" sz="2400" dirty="0" err="1"/>
-              <a:t>odigniscil</a:t>
-            </a:r>
-            <a:r>
-              <a:rPr lang="en-GB" sz="2400" dirty="0"/>
-              <a:t> </a:t>
-            </a:r>
-            <a:r>
-              <a:rPr lang="en-GB" sz="2400" dirty="0" err="1"/>
-              <a:t>earum</a:t>
-            </a:r>
-            <a:r>
-              <a:rPr lang="en-GB" sz="2400" dirty="0"/>
-              <a:t> </a:t>
-            </a:r>
-            <a:r>
-              <a:rPr lang="en-GB" sz="2400" dirty="0" err="1"/>
-              <a:t>verios</a:t>
-            </a:r>
-            <a:r>
-              <a:rPr lang="en-GB" sz="2400" dirty="0"/>
-              <a:t> </a:t>
-            </a:r>
-            <a:r>
-              <a:rPr lang="en-GB" sz="2400" dirty="0" err="1"/>
-              <a:t>nonsequam</a:t>
-            </a:r>
-            <a:r>
-              <a:rPr lang="en-GB" sz="2400" dirty="0"/>
-              <a:t> </a:t>
-            </a:r>
-            <a:r>
-              <a:rPr lang="en-GB" sz="2400" dirty="0" err="1"/>
-              <a:t>duciis</a:t>
-            </a:r>
-            <a:r>
-              <a:rPr lang="en-GB" sz="2400" dirty="0"/>
-              <a:t> et</a:t>
+            <a:pPr algn="just"/>
+            <a:r>
+              <a:rPr lang="en-GB" dirty="0"/>
+              <a:t>With work on the prototype complete, we showed it to our client and then took her feedback to create some web pages to better show what these features could look like.</a:t>
             </a:r>
           </a:p>
           <a:p>
@@ -10391,7 +9808,7 @@
         <p:spPr>
           <a:xfrm>
             <a:off x="7509472" y="11393189"/>
-            <a:ext cx="6364678" cy="3368976"/>
+            <a:ext cx="6364678" cy="2260980"/>
           </a:xfrm>
           <a:prstGeom prst="rect">
             <a:avLst/>
@@ -10406,7 +9823,7 @@
           </a:ln>
           <a:extLst>
             <a:ext uri="{C572A759-6A51-4108-AA02-DFA0A04FC94B}">
-              <ma14:wrappingTextBoxFlag xmlns:ma14="http://schemas.microsoft.com/office/mac/drawingml/2011/main" xmlns:a14="http://schemas.microsoft.com/office/drawing/2010/main" xmlns:m="http://schemas.openxmlformats.org/officeDocument/2006/math" xmlns="" val="1"/>
+              <ma14:wrappingTextBoxFlag xmlns="" xmlns:m="http://schemas.openxmlformats.org/officeDocument/2006/math" xmlns:a14="http://schemas.microsoft.com/office/drawing/2010/main" xmlns:ma14="http://schemas.microsoft.com/office/mac/drawingml/2011/main" val="1"/>
             </a:ext>
           </a:extLst>
         </p:spPr>
@@ -10427,401 +9844,10 @@
           <a:p>
             <a:pPr algn="just"/>
             <a:r>
-              <a:rPr dirty="0"/>
-              <a:t>As </a:t>
-            </a:r>
-            <a:r>
-              <a:rPr dirty="0" err="1"/>
-              <a:t>verepe</a:t>
-            </a:r>
-            <a:r>
-              <a:rPr dirty="0"/>
-              <a:t> </a:t>
-            </a:r>
-            <a:r>
-              <a:rPr dirty="0" err="1"/>
-              <a:t>sectis</a:t>
-            </a:r>
-            <a:r>
-              <a:rPr dirty="0"/>
-              <a:t> </a:t>
-            </a:r>
-            <a:r>
-              <a:rPr dirty="0" err="1"/>
-              <a:t>enda</a:t>
-            </a:r>
-            <a:r>
-              <a:rPr dirty="0"/>
-              <a:t> di </a:t>
-            </a:r>
-            <a:r>
-              <a:rPr dirty="0" err="1"/>
-              <a:t>incto</a:t>
-            </a:r>
-            <a:r>
-              <a:rPr dirty="0"/>
-              <a:t> </a:t>
-            </a:r>
-            <a:r>
-              <a:rPr dirty="0" err="1"/>
-              <a:t>etusda</a:t>
-            </a:r>
-            <a:r>
-              <a:rPr dirty="0"/>
-              <a:t> </a:t>
-            </a:r>
-            <a:r>
-              <a:rPr dirty="0" err="1"/>
-              <a:t>delectet</a:t>
-            </a:r>
-            <a:r>
-              <a:rPr dirty="0"/>
-              <a:t> </a:t>
-            </a:r>
-            <a:r>
-              <a:rPr dirty="0" err="1"/>
-              <a:t>eaque</a:t>
-            </a:r>
-            <a:r>
-              <a:rPr dirty="0"/>
-              <a:t> </a:t>
-            </a:r>
-            <a:r>
-              <a:rPr dirty="0" err="1"/>
-              <a:t>simusda</a:t>
-            </a:r>
-            <a:r>
-              <a:rPr dirty="0"/>
-              <a:t> </a:t>
-            </a:r>
-            <a:r>
-              <a:rPr dirty="0" err="1"/>
-              <a:t>ndanimus</a:t>
-            </a:r>
-            <a:r>
-              <a:rPr dirty="0"/>
-              <a:t>, sin </a:t>
-            </a:r>
-            <a:r>
-              <a:rPr dirty="0" err="1"/>
-              <a:t>cori</a:t>
-            </a:r>
-            <a:r>
-              <a:rPr dirty="0"/>
-              <a:t> rem id </a:t>
-            </a:r>
-            <a:r>
-              <a:rPr dirty="0" err="1"/>
-              <a:t>maximillut</a:t>
-            </a:r>
-            <a:r>
-              <a:rPr dirty="0"/>
-              <a:t> </a:t>
-            </a:r>
-            <a:r>
-              <a:rPr dirty="0" err="1"/>
-              <a:t>hari</a:t>
-            </a:r>
-            <a:r>
-              <a:rPr dirty="0"/>
-              <a:t> con </a:t>
-            </a:r>
-            <a:r>
-              <a:rPr dirty="0" err="1"/>
-              <a:t>ea</a:t>
-            </a:r>
-            <a:r>
-              <a:rPr dirty="0"/>
-              <a:t> </a:t>
-            </a:r>
-            <a:r>
-              <a:rPr dirty="0" err="1"/>
-              <a:t>quiam</a:t>
-            </a:r>
-            <a:r>
-              <a:rPr dirty="0"/>
-              <a:t> </a:t>
-            </a:r>
-            <a:r>
-              <a:rPr dirty="0" err="1"/>
-              <a:t>quam</a:t>
-            </a:r>
-            <a:r>
-              <a:rPr dirty="0"/>
-              <a:t> et </a:t>
-            </a:r>
-            <a:r>
-              <a:rPr dirty="0" err="1"/>
-              <a:t>enduci</a:t>
-            </a:r>
-            <a:r>
-              <a:rPr dirty="0"/>
-              <a:t> </a:t>
-            </a:r>
-            <a:r>
-              <a:rPr dirty="0" err="1"/>
-              <a:t>idunt</a:t>
-            </a:r>
-            <a:r>
-              <a:rPr dirty="0"/>
-              <a:t>, </a:t>
-            </a:r>
-            <a:r>
-              <a:rPr dirty="0" err="1"/>
-              <a:t>corecta</a:t>
-            </a:r>
-            <a:r>
-              <a:rPr dirty="0"/>
-              <a:t> </a:t>
-            </a:r>
-            <a:r>
-              <a:rPr dirty="0" err="1"/>
-              <a:t>alicimp</a:t>
-            </a:r>
-            <a:r>
-              <a:rPr dirty="0"/>
-              <a:t> </a:t>
-            </a:r>
-            <a:r>
-              <a:rPr dirty="0" err="1"/>
-              <a:t>oriaeperum</a:t>
-            </a:r>
-            <a:r>
-              <a:rPr dirty="0"/>
-              <a:t> </a:t>
-            </a:r>
-            <a:r>
-              <a:rPr dirty="0" err="1"/>
-              <a:t>iusaeped</a:t>
-            </a:r>
-            <a:r>
-              <a:rPr dirty="0"/>
-              <a:t> </a:t>
-            </a:r>
-            <a:r>
-              <a:rPr dirty="0" err="1"/>
-              <a:t>unt</a:t>
-            </a:r>
-            <a:r>
-              <a:rPr dirty="0"/>
-              <a:t> </a:t>
-            </a:r>
-            <a:r>
-              <a:rPr dirty="0" err="1"/>
-              <a:t>quis</a:t>
-            </a:r>
-            <a:r>
-              <a:rPr dirty="0"/>
-              <a:t> et </a:t>
-            </a:r>
-            <a:r>
-              <a:rPr dirty="0" err="1"/>
-              <a:t>ut</a:t>
-            </a:r>
-            <a:r>
-              <a:rPr dirty="0"/>
-              <a:t> </a:t>
-            </a:r>
-            <a:r>
-              <a:rPr dirty="0" err="1"/>
-              <a:t>abor</a:t>
-            </a:r>
-            <a:r>
-              <a:rPr dirty="0"/>
-              <a:t> </a:t>
-            </a:r>
-            <a:r>
-              <a:rPr dirty="0" err="1"/>
-              <a:t>ame</a:t>
-            </a:r>
-            <a:r>
-              <a:rPr dirty="0"/>
-              <a:t> </a:t>
-            </a:r>
-            <a:r>
-              <a:rPr dirty="0" err="1"/>
-              <a:t>alis</a:t>
-            </a:r>
-            <a:r>
-              <a:rPr dirty="0"/>
-              <a:t> </a:t>
-            </a:r>
-            <a:r>
-              <a:rPr dirty="0" err="1"/>
-              <a:t>utatur</a:t>
-            </a:r>
-            <a:r>
-              <a:rPr dirty="0"/>
-              <a:t> as senet a </a:t>
-            </a:r>
-            <a:r>
-              <a:rPr dirty="0" err="1"/>
-              <a:t>quibus</a:t>
-            </a:r>
-            <a:r>
-              <a:rPr dirty="0"/>
-              <a:t> </a:t>
-            </a:r>
-            <a:r>
-              <a:rPr dirty="0" err="1"/>
-              <a:t>dolutatur</a:t>
-            </a:r>
-            <a:r>
-              <a:rPr dirty="0"/>
-              <a:t> </a:t>
-            </a:r>
-            <a:r>
-              <a:rPr dirty="0" err="1"/>
-              <a:t>sedit</a:t>
-            </a:r>
-            <a:r>
-              <a:rPr dirty="0"/>
-              <a:t> </a:t>
-            </a:r>
-            <a:r>
-              <a:rPr dirty="0" err="1"/>
-              <a:t>aliam</a:t>
-            </a:r>
-            <a:r>
-              <a:rPr dirty="0"/>
-              <a:t> </a:t>
-            </a:r>
-            <a:r>
-              <a:rPr dirty="0" err="1"/>
-              <a:t>apienda</a:t>
-            </a:r>
-            <a:r>
-              <a:rPr dirty="0"/>
-              <a:t> </a:t>
-            </a:r>
-            <a:r>
-              <a:rPr dirty="0" err="1"/>
-              <a:t>versper</a:t>
-            </a:r>
-            <a:r>
-              <a:rPr dirty="0"/>
-              <a:t> </a:t>
-            </a:r>
-            <a:r>
-              <a:rPr dirty="0" err="1"/>
-              <a:t>feriti</a:t>
-            </a:r>
-            <a:r>
-              <a:rPr dirty="0"/>
-              <a:t> </a:t>
-            </a:r>
-            <a:r>
-              <a:rPr dirty="0" err="1"/>
-              <a:t>delia</a:t>
-            </a:r>
-            <a:r>
-              <a:rPr dirty="0"/>
-              <a:t> pa </a:t>
-            </a:r>
-            <a:r>
-              <a:rPr dirty="0" err="1"/>
-              <a:t>dolo</a:t>
-            </a:r>
-            <a:r>
-              <a:rPr dirty="0"/>
-              <a:t> </a:t>
-            </a:r>
-            <a:r>
-              <a:rPr dirty="0" err="1"/>
-              <a:t>quamus</a:t>
-            </a:r>
-            <a:r>
-              <a:rPr dirty="0"/>
-              <a:t> arum es </a:t>
-            </a:r>
-            <a:r>
-              <a:rPr dirty="0" err="1"/>
-              <a:t>endellu</a:t>
-            </a:r>
-            <a:r>
-              <a:rPr dirty="0"/>
-              <a:t> </a:t>
-            </a:r>
-            <a:r>
-              <a:rPr dirty="0" err="1"/>
-              <a:t>pisquia</a:t>
-            </a:r>
-            <a:r>
-              <a:rPr dirty="0"/>
-              <a:t> </a:t>
-            </a:r>
-            <a:r>
-              <a:rPr dirty="0" err="1"/>
-              <a:t>aditatur</a:t>
-            </a:r>
-            <a:r>
-              <a:rPr dirty="0"/>
-              <a:t> </a:t>
-            </a:r>
-            <a:r>
-              <a:rPr dirty="0" err="1"/>
-              <a:t>audam</a:t>
-            </a:r>
-            <a:r>
-              <a:rPr dirty="0"/>
-              <a:t> </a:t>
-            </a:r>
-            <a:r>
-              <a:rPr dirty="0" err="1"/>
-              <a:t>earupid</a:t>
-            </a:r>
-            <a:r>
-              <a:rPr dirty="0"/>
-              <a:t> quo </a:t>
-            </a:r>
-            <a:r>
-              <a:rPr dirty="0" err="1"/>
-              <a:t>quunt</a:t>
-            </a:r>
-            <a:r>
-              <a:rPr dirty="0"/>
-              <a:t> </a:t>
-            </a:r>
-            <a:r>
-              <a:rPr dirty="0" err="1"/>
-              <a:t>odigniscil</a:t>
-            </a:r>
-            <a:r>
-              <a:rPr dirty="0"/>
-              <a:t> </a:t>
-            </a:r>
-            <a:r>
-              <a:rPr dirty="0" err="1"/>
-              <a:t>earum</a:t>
-            </a:r>
-            <a:r>
-              <a:rPr dirty="0"/>
-              <a:t> </a:t>
-            </a:r>
-            <a:r>
-              <a:rPr dirty="0" err="1"/>
-              <a:t>verios</a:t>
-            </a:r>
-            <a:r>
-              <a:rPr dirty="0"/>
-              <a:t> </a:t>
-            </a:r>
-            <a:r>
-              <a:rPr dirty="0" err="1"/>
-              <a:t>nonsequam</a:t>
-            </a:r>
-            <a:r>
-              <a:rPr dirty="0"/>
-              <a:t> </a:t>
-            </a:r>
-            <a:r>
-              <a:rPr dirty="0" err="1"/>
-              <a:t>duciis</a:t>
-            </a:r>
-            <a:r>
-              <a:rPr dirty="0"/>
-              <a:t> et</a:t>
-            </a:r>
+              <a:rPr lang="en-GB" dirty="0"/>
+              <a:t>Our protype was developed using Figma. We based it on the already existing Wix site for Echo, and one of our priorities was trying to stay as faithful to the original design as possible. We didn’t want to over complicate things</a:t>
+            </a:r>
+            <a:endParaRPr dirty="0"/>
           </a:p>
         </p:txBody>
       </p:sp>
@@ -10901,112 +9927,7 @@
             <a:effectLst/>
             <a:extLst>
               <a:ext uri="{C572A759-6A51-4108-AA02-DFA0A04FC94B}">
-                <ma14:wrappingTextBoxFlag xmlns:ma14="http://schemas.microsoft.com/office/mac/drawingml/2011/main" xmlns:a14="http://schemas.microsoft.com/office/drawing/2010/main" xmlns:m="http://schemas.openxmlformats.org/officeDocument/2006/math" xmlns="" val="1"/>
-              </a:ext>
-            </a:extLst>
-          </p:spPr>
-          <p:txBody>
-            <a:bodyPr wrap="square" lIns="22277" tIns="22277" rIns="22277" bIns="22277" numCol="1" anchor="ctr">
-              <a:spAutoFit/>
-            </a:bodyPr>
-            <a:lstStyle>
-              <a:lvl1pPr algn="ctr">
-                <a:defRPr sz="5400">
-                  <a:solidFill>
-                    <a:srgbClr val="FFFFFF"/>
-                  </a:solidFill>
-                  <a:latin typeface="Arial"/>
-                  <a:ea typeface="Arial"/>
-                  <a:cs typeface="Arial"/>
-                  <a:sym typeface="Arial"/>
-                </a:defRPr>
-              </a:lvl1pPr>
-            </a:lstStyle>
-            <a:p>
-              <a:r>
-                <a:t>figures</a:t>
-              </a:r>
-            </a:p>
-          </p:txBody>
-        </p:sp>
-      </p:grpSp>
-      <p:grpSp>
-        <p:nvGrpSpPr>
-          <p:cNvPr id="395" name="Rectangle 37"/>
-          <p:cNvGrpSpPr/>
-          <p:nvPr/>
-        </p:nvGrpSpPr>
-        <p:grpSpPr>
-          <a:xfrm>
-            <a:off x="7509472" y="14915899"/>
-            <a:ext cx="6364678" cy="2535744"/>
-            <a:chOff x="0" y="-1"/>
-            <a:chExt cx="6364677" cy="2535742"/>
-          </a:xfrm>
-        </p:grpSpPr>
-        <p:sp>
-          <p:nvSpPr>
-            <p:cNvPr id="393" name="Rectangle"/>
-            <p:cNvSpPr/>
-            <p:nvPr/>
-          </p:nvSpPr>
-          <p:spPr>
-            <a:xfrm>
-              <a:off x="0" y="-1"/>
-              <a:ext cx="6364677" cy="2535742"/>
-            </a:xfrm>
-            <a:prstGeom prst="rect">
-              <a:avLst/>
-            </a:prstGeom>
-            <a:solidFill>
-              <a:srgbClr val="DBDBDB"/>
-            </a:solidFill>
-            <a:ln w="12700" cap="flat">
-              <a:noFill/>
-              <a:miter lim="400000"/>
-            </a:ln>
-            <a:effectLst/>
-          </p:spPr>
-          <p:txBody>
-            <a:bodyPr wrap="square" lIns="22277" tIns="22277" rIns="22277" bIns="22277" numCol="1" anchor="ctr">
-              <a:noAutofit/>
-            </a:bodyPr>
-            <a:lstStyle/>
-            <a:p>
-              <a:pPr algn="ctr">
-                <a:defRPr>
-                  <a:solidFill>
-                    <a:srgbClr val="FFFFFF"/>
-                  </a:solidFill>
-                </a:defRPr>
-              </a:pPr>
-              <a:endParaRPr/>
-            </a:p>
-          </p:txBody>
-        </p:sp>
-        <p:sp>
-          <p:nvSpPr>
-            <p:cNvPr id="394" name="figures"/>
-            <p:cNvSpPr txBox="1"/>
-            <p:nvPr/>
-          </p:nvSpPr>
-          <p:spPr>
-            <a:xfrm>
-              <a:off x="0" y="829878"/>
-              <a:ext cx="6364677" cy="875985"/>
-            </a:xfrm>
-            <a:prstGeom prst="rect">
-              <a:avLst/>
-            </a:prstGeom>
-            <a:noFill/>
-            <a:ln w="3175" cap="flat">
-              <a:noFill/>
-              <a:miter lim="400000"/>
-            </a:ln>
-            <a:effectLst/>
-            <a:extLst>
-              <a:ext uri="{C572A759-6A51-4108-AA02-DFA0A04FC94B}">
-                <ma14:wrappingTextBoxFlag xmlns:ma14="http://schemas.microsoft.com/office/mac/drawingml/2011/main" xmlns:a14="http://schemas.microsoft.com/office/drawing/2010/main" xmlns:m="http://schemas.openxmlformats.org/officeDocument/2006/math" xmlns="" val="1"/>
+                <ma14:wrappingTextBoxFlag xmlns="" xmlns:m="http://schemas.openxmlformats.org/officeDocument/2006/math" xmlns:a14="http://schemas.microsoft.com/office/drawing/2010/main" xmlns:ma14="http://schemas.microsoft.com/office/mac/drawingml/2011/main" val="1"/>
               </a:ext>
             </a:extLst>
           </p:spPr>
@@ -11043,7 +9964,7 @@
         </p:nvSpPr>
         <p:spPr>
           <a:xfrm>
-            <a:off x="7509472" y="17655647"/>
+            <a:off x="7561166" y="15207792"/>
             <a:ext cx="6364678" cy="4846303"/>
           </a:xfrm>
           <a:prstGeom prst="rect">
@@ -11059,7 +9980,7 @@
           </a:ln>
           <a:extLst>
             <a:ext uri="{C572A759-6A51-4108-AA02-DFA0A04FC94B}">
-              <ma14:wrappingTextBoxFlag xmlns:ma14="http://schemas.microsoft.com/office/mac/drawingml/2011/main" xmlns:a14="http://schemas.microsoft.com/office/drawing/2010/main" xmlns:m="http://schemas.openxmlformats.org/officeDocument/2006/math" xmlns="" val="1"/>
+              <ma14:wrappingTextBoxFlag xmlns="" xmlns:m="http://schemas.openxmlformats.org/officeDocument/2006/math" xmlns:a14="http://schemas.microsoft.com/office/drawing/2010/main" xmlns:ma14="http://schemas.microsoft.com/office/mac/drawingml/2011/main" val="1"/>
             </a:ext>
           </a:extLst>
         </p:spPr>
@@ -11080,116 +10001,529 @@
           <a:p>
             <a:pPr algn="just"/>
             <a:r>
-              <a:t>As verepe sectis enda di incto etusda delectet eaque simusda ndanimus, sin cori rem id maximillut hari con ea quiam quam et enduci idunt, corecta alicimp oriaeperum iusaeped unt quis et ut abor ame alis utatur as senet a quibus dolutatur sedit aliam apienda versper feriti delia pa dolo quamus arum es endellu pisquia aditatur audam earupid quo quunt odigniscil earum verios nonsequam duciis et apienda versper feriti delia pa dolo quamus arum es endellu pisquia aditatur audam earupid quo quunt odigniscil earum verios nonsequam</a:t>
-            </a:r>
+              <a:rPr dirty="0"/>
+              <a:t>As </a:t>
+            </a:r>
+            <a:r>
+              <a:rPr dirty="0" err="1"/>
+              <a:t>verepe</a:t>
+            </a:r>
+            <a:r>
+              <a:rPr dirty="0"/>
+              <a:t> </a:t>
+            </a:r>
+            <a:r>
+              <a:rPr dirty="0" err="1"/>
+              <a:t>sectis</a:t>
+            </a:r>
+            <a:r>
+              <a:rPr dirty="0"/>
+              <a:t> </a:t>
+            </a:r>
+            <a:r>
+              <a:rPr dirty="0" err="1"/>
+              <a:t>enda</a:t>
+            </a:r>
+            <a:r>
+              <a:rPr dirty="0"/>
+              <a:t> di </a:t>
+            </a:r>
+            <a:r>
+              <a:rPr dirty="0" err="1"/>
+              <a:t>incto</a:t>
+            </a:r>
+            <a:r>
+              <a:rPr dirty="0"/>
+              <a:t> </a:t>
+            </a:r>
+            <a:r>
+              <a:rPr dirty="0" err="1"/>
+              <a:t>etusda</a:t>
+            </a:r>
+            <a:r>
+              <a:rPr dirty="0"/>
+              <a:t> </a:t>
+            </a:r>
+            <a:r>
+              <a:rPr dirty="0" err="1"/>
+              <a:t>delectet</a:t>
+            </a:r>
+            <a:r>
+              <a:rPr dirty="0"/>
+              <a:t> </a:t>
+            </a:r>
+            <a:r>
+              <a:rPr dirty="0" err="1"/>
+              <a:t>eaque</a:t>
+            </a:r>
+            <a:r>
+              <a:rPr dirty="0"/>
+              <a:t> </a:t>
+            </a:r>
+            <a:r>
+              <a:rPr dirty="0" err="1"/>
+              <a:t>simusda</a:t>
+            </a:r>
+            <a:r>
+              <a:rPr dirty="0"/>
+              <a:t> </a:t>
+            </a:r>
+            <a:r>
+              <a:rPr dirty="0" err="1"/>
+              <a:t>ndanimus</a:t>
+            </a:r>
+            <a:r>
+              <a:rPr dirty="0"/>
+              <a:t>, sin </a:t>
+            </a:r>
+            <a:r>
+              <a:rPr dirty="0" err="1"/>
+              <a:t>cori</a:t>
+            </a:r>
+            <a:r>
+              <a:rPr dirty="0"/>
+              <a:t> rem id </a:t>
+            </a:r>
+            <a:r>
+              <a:rPr dirty="0" err="1"/>
+              <a:t>maximillut</a:t>
+            </a:r>
+            <a:r>
+              <a:rPr dirty="0"/>
+              <a:t> </a:t>
+            </a:r>
+            <a:r>
+              <a:rPr dirty="0" err="1"/>
+              <a:t>hari</a:t>
+            </a:r>
+            <a:r>
+              <a:rPr dirty="0"/>
+              <a:t> con </a:t>
+            </a:r>
+            <a:r>
+              <a:rPr dirty="0" err="1"/>
+              <a:t>ea</a:t>
+            </a:r>
+            <a:r>
+              <a:rPr dirty="0"/>
+              <a:t> </a:t>
+            </a:r>
+            <a:r>
+              <a:rPr dirty="0" err="1"/>
+              <a:t>quiam</a:t>
+            </a:r>
+            <a:r>
+              <a:rPr dirty="0"/>
+              <a:t> </a:t>
+            </a:r>
+            <a:r>
+              <a:rPr dirty="0" err="1"/>
+              <a:t>quam</a:t>
+            </a:r>
+            <a:r>
+              <a:rPr dirty="0"/>
+              <a:t> et </a:t>
+            </a:r>
+            <a:r>
+              <a:rPr dirty="0" err="1"/>
+              <a:t>enduci</a:t>
+            </a:r>
+            <a:r>
+              <a:rPr dirty="0"/>
+              <a:t> </a:t>
+            </a:r>
+            <a:r>
+              <a:rPr dirty="0" err="1"/>
+              <a:t>idunt</a:t>
+            </a:r>
+            <a:r>
+              <a:rPr dirty="0"/>
+              <a:t>, </a:t>
+            </a:r>
+            <a:r>
+              <a:rPr dirty="0" err="1"/>
+              <a:t>corecta</a:t>
+            </a:r>
+            <a:r>
+              <a:rPr dirty="0"/>
+              <a:t> </a:t>
+            </a:r>
+            <a:r>
+              <a:rPr dirty="0" err="1"/>
+              <a:t>alicimp</a:t>
+            </a:r>
+            <a:r>
+              <a:rPr dirty="0"/>
+              <a:t> </a:t>
+            </a:r>
+            <a:r>
+              <a:rPr dirty="0" err="1"/>
+              <a:t>oriaeperum</a:t>
+            </a:r>
+            <a:r>
+              <a:rPr dirty="0"/>
+              <a:t> </a:t>
+            </a:r>
+            <a:r>
+              <a:rPr dirty="0" err="1"/>
+              <a:t>iusaeped</a:t>
+            </a:r>
+            <a:r>
+              <a:rPr dirty="0"/>
+              <a:t> </a:t>
+            </a:r>
+            <a:r>
+              <a:rPr dirty="0" err="1"/>
+              <a:t>unt</a:t>
+            </a:r>
+            <a:r>
+              <a:rPr dirty="0"/>
+              <a:t> </a:t>
+            </a:r>
+            <a:r>
+              <a:rPr dirty="0" err="1"/>
+              <a:t>quis</a:t>
+            </a:r>
+            <a:r>
+              <a:rPr dirty="0"/>
+              <a:t> et </a:t>
+            </a:r>
+            <a:r>
+              <a:rPr dirty="0" err="1"/>
+              <a:t>ut</a:t>
+            </a:r>
+            <a:r>
+              <a:rPr dirty="0"/>
+              <a:t> </a:t>
+            </a:r>
+            <a:r>
+              <a:rPr dirty="0" err="1"/>
+              <a:t>abor</a:t>
+            </a:r>
+            <a:r>
+              <a:rPr dirty="0"/>
+              <a:t> </a:t>
+            </a:r>
+            <a:r>
+              <a:rPr dirty="0" err="1"/>
+              <a:t>ame</a:t>
+            </a:r>
+            <a:r>
+              <a:rPr dirty="0"/>
+              <a:t> </a:t>
+            </a:r>
+            <a:r>
+              <a:rPr dirty="0" err="1"/>
+              <a:t>alis</a:t>
+            </a:r>
+            <a:r>
+              <a:rPr dirty="0"/>
+              <a:t> </a:t>
+            </a:r>
+            <a:r>
+              <a:rPr dirty="0" err="1"/>
+              <a:t>utatur</a:t>
+            </a:r>
+            <a:r>
+              <a:rPr dirty="0"/>
+              <a:t> as senet a </a:t>
+            </a:r>
+            <a:r>
+              <a:rPr dirty="0" err="1"/>
+              <a:t>quibus</a:t>
+            </a:r>
+            <a:r>
+              <a:rPr dirty="0"/>
+              <a:t> </a:t>
+            </a:r>
+            <a:r>
+              <a:rPr dirty="0" err="1"/>
+              <a:t>dolutatur</a:t>
+            </a:r>
+            <a:r>
+              <a:rPr dirty="0"/>
+              <a:t> </a:t>
+            </a:r>
+            <a:r>
+              <a:rPr dirty="0" err="1"/>
+              <a:t>sedit</a:t>
+            </a:r>
+            <a:r>
+              <a:rPr dirty="0"/>
+              <a:t> </a:t>
+            </a:r>
+            <a:r>
+              <a:rPr dirty="0" err="1"/>
+              <a:t>aliam</a:t>
+            </a:r>
+            <a:r>
+              <a:rPr dirty="0"/>
+              <a:t> </a:t>
+            </a:r>
+            <a:r>
+              <a:rPr dirty="0" err="1"/>
+              <a:t>apienda</a:t>
+            </a:r>
+            <a:r>
+              <a:rPr dirty="0"/>
+              <a:t> </a:t>
+            </a:r>
+            <a:r>
+              <a:rPr dirty="0" err="1"/>
+              <a:t>versper</a:t>
+            </a:r>
+            <a:r>
+              <a:rPr dirty="0"/>
+              <a:t> </a:t>
+            </a:r>
+            <a:r>
+              <a:rPr dirty="0" err="1"/>
+              <a:t>feriti</a:t>
+            </a:r>
+            <a:r>
+              <a:rPr dirty="0"/>
+              <a:t> </a:t>
+            </a:r>
+            <a:r>
+              <a:rPr dirty="0" err="1"/>
+              <a:t>delia</a:t>
+            </a:r>
+            <a:r>
+              <a:rPr dirty="0"/>
+              <a:t> pa </a:t>
+            </a:r>
+            <a:r>
+              <a:rPr dirty="0" err="1"/>
+              <a:t>dolo</a:t>
+            </a:r>
+            <a:r>
+              <a:rPr dirty="0"/>
+              <a:t> </a:t>
+            </a:r>
+            <a:r>
+              <a:rPr dirty="0" err="1"/>
+              <a:t>quamus</a:t>
+            </a:r>
+            <a:r>
+              <a:rPr dirty="0"/>
+              <a:t> arum es </a:t>
+            </a:r>
+            <a:r>
+              <a:rPr dirty="0" err="1"/>
+              <a:t>endellu</a:t>
+            </a:r>
+            <a:r>
+              <a:rPr dirty="0"/>
+              <a:t> </a:t>
+            </a:r>
+            <a:r>
+              <a:rPr dirty="0" err="1"/>
+              <a:t>pisquia</a:t>
+            </a:r>
+            <a:r>
+              <a:rPr dirty="0"/>
+              <a:t> </a:t>
+            </a:r>
+            <a:r>
+              <a:rPr dirty="0" err="1"/>
+              <a:t>aditatur</a:t>
+            </a:r>
+            <a:r>
+              <a:rPr dirty="0"/>
+              <a:t> </a:t>
+            </a:r>
+            <a:r>
+              <a:rPr dirty="0" err="1"/>
+              <a:t>audam</a:t>
+            </a:r>
+            <a:r>
+              <a:rPr dirty="0"/>
+              <a:t> </a:t>
+            </a:r>
+            <a:r>
+              <a:rPr dirty="0" err="1"/>
+              <a:t>earupid</a:t>
+            </a:r>
+            <a:r>
+              <a:rPr dirty="0"/>
+              <a:t> quo </a:t>
+            </a:r>
+            <a:r>
+              <a:rPr dirty="0" err="1"/>
+              <a:t>quunt</a:t>
+            </a:r>
+            <a:r>
+              <a:rPr dirty="0"/>
+              <a:t> </a:t>
+            </a:r>
+            <a:r>
+              <a:rPr dirty="0" err="1"/>
+              <a:t>odigniscil</a:t>
+            </a:r>
+            <a:r>
+              <a:rPr dirty="0"/>
+              <a:t> </a:t>
+            </a:r>
+            <a:r>
+              <a:rPr dirty="0" err="1"/>
+              <a:t>earum</a:t>
+            </a:r>
+            <a:r>
+              <a:rPr dirty="0"/>
+              <a:t> </a:t>
+            </a:r>
+            <a:r>
+              <a:rPr dirty="0" err="1"/>
+              <a:t>verios</a:t>
+            </a:r>
+            <a:r>
+              <a:rPr dirty="0"/>
+              <a:t> </a:t>
+            </a:r>
+            <a:r>
+              <a:rPr dirty="0" err="1"/>
+              <a:t>nonsequam</a:t>
+            </a:r>
+            <a:r>
+              <a:rPr dirty="0"/>
+              <a:t> </a:t>
+            </a:r>
+            <a:r>
+              <a:rPr dirty="0" err="1"/>
+              <a:t>duciis</a:t>
+            </a:r>
+            <a:r>
+              <a:rPr dirty="0"/>
+              <a:t> et </a:t>
+            </a:r>
+            <a:r>
+              <a:rPr dirty="0" err="1"/>
+              <a:t>apienda</a:t>
+            </a:r>
+            <a:r>
+              <a:rPr dirty="0"/>
+              <a:t> </a:t>
+            </a:r>
+            <a:r>
+              <a:rPr dirty="0" err="1"/>
+              <a:t>versper</a:t>
+            </a:r>
+            <a:r>
+              <a:rPr dirty="0"/>
+              <a:t> </a:t>
+            </a:r>
+            <a:r>
+              <a:rPr dirty="0" err="1"/>
+              <a:t>feriti</a:t>
+            </a:r>
+            <a:r>
+              <a:rPr dirty="0"/>
+              <a:t> </a:t>
+            </a:r>
+            <a:r>
+              <a:rPr dirty="0" err="1"/>
+              <a:t>delia</a:t>
+            </a:r>
+            <a:r>
+              <a:rPr dirty="0"/>
+              <a:t> pa </a:t>
+            </a:r>
+            <a:r>
+              <a:rPr dirty="0" err="1"/>
+              <a:t>dolo</a:t>
+            </a:r>
+            <a:r>
+              <a:rPr dirty="0"/>
+              <a:t> </a:t>
+            </a:r>
+            <a:r>
+              <a:rPr dirty="0" err="1"/>
+              <a:t>quamus</a:t>
+            </a:r>
+            <a:r>
+              <a:rPr dirty="0"/>
+              <a:t> arum es </a:t>
+            </a:r>
+            <a:r>
+              <a:rPr dirty="0" err="1"/>
+              <a:t>endellu</a:t>
+            </a:r>
+            <a:r>
+              <a:rPr dirty="0"/>
+              <a:t> </a:t>
+            </a:r>
+            <a:r>
+              <a:rPr dirty="0" err="1"/>
+              <a:t>pisquia</a:t>
+            </a:r>
+            <a:r>
+              <a:rPr dirty="0"/>
+              <a:t> </a:t>
+            </a:r>
+            <a:r>
+              <a:rPr dirty="0" err="1"/>
+              <a:t>aditatur</a:t>
+            </a:r>
+            <a:r>
+              <a:rPr dirty="0"/>
+              <a:t> </a:t>
+            </a:r>
+            <a:r>
+              <a:rPr dirty="0" err="1"/>
+              <a:t>audam</a:t>
+            </a:r>
+            <a:r>
+              <a:rPr dirty="0"/>
+              <a:t> </a:t>
+            </a:r>
+            <a:r>
+              <a:rPr dirty="0" err="1"/>
+              <a:t>earupid</a:t>
+            </a:r>
+            <a:r>
+              <a:rPr dirty="0"/>
+              <a:t> quo </a:t>
+            </a:r>
+            <a:r>
+              <a:rPr dirty="0" err="1"/>
+              <a:t>quunt</a:t>
+            </a:r>
+            <a:r>
+              <a:rPr dirty="0"/>
+              <a:t> </a:t>
+            </a:r>
+            <a:r>
+              <a:rPr dirty="0" err="1"/>
+              <a:t>odigniscil</a:t>
+            </a:r>
+            <a:r>
+              <a:rPr dirty="0"/>
+              <a:t> </a:t>
+            </a:r>
+            <a:r>
+              <a:rPr dirty="0" err="1"/>
+              <a:t>earum</a:t>
+            </a:r>
+            <a:r>
+              <a:rPr dirty="0"/>
+              <a:t> </a:t>
+            </a:r>
+            <a:r>
+              <a:rPr dirty="0" err="1"/>
+              <a:t>verios</a:t>
+            </a:r>
+            <a:r>
+              <a:rPr dirty="0"/>
+              <a:t> </a:t>
+            </a:r>
+            <a:r>
+              <a:rPr dirty="0" err="1"/>
+              <a:t>nonsequam</a:t>
+            </a:r>
+            <a:endParaRPr dirty="0"/>
           </a:p>
         </p:txBody>
       </p:sp>
-      <p:grpSp>
-        <p:nvGrpSpPr>
-          <p:cNvPr id="402" name="Rectangle 40"/>
-          <p:cNvGrpSpPr/>
-          <p:nvPr/>
-        </p:nvGrpSpPr>
-        <p:grpSpPr>
-          <a:xfrm>
-            <a:off x="571603" y="23474467"/>
-            <a:ext cx="6364679" cy="3539169"/>
-            <a:chOff x="-1" y="-1"/>
-            <a:chExt cx="6364678" cy="3539167"/>
-          </a:xfrm>
-        </p:grpSpPr>
-        <p:sp>
-          <p:nvSpPr>
-            <p:cNvPr id="400" name="Rectangle"/>
-            <p:cNvSpPr/>
-            <p:nvPr/>
-          </p:nvSpPr>
-          <p:spPr>
-            <a:xfrm>
-              <a:off x="-1" y="-1"/>
-              <a:ext cx="6364678" cy="3539167"/>
-            </a:xfrm>
-            <a:prstGeom prst="rect">
-              <a:avLst/>
-            </a:prstGeom>
-            <a:solidFill>
-              <a:srgbClr val="DBDBDB"/>
-            </a:solidFill>
-            <a:ln w="12700" cap="flat">
-              <a:noFill/>
-              <a:miter lim="400000"/>
-            </a:ln>
-            <a:effectLst/>
-          </p:spPr>
-          <p:txBody>
-            <a:bodyPr wrap="square" lIns="22277" tIns="22277" rIns="22277" bIns="22277" numCol="1" anchor="ctr">
-              <a:noAutofit/>
-            </a:bodyPr>
-            <a:lstStyle/>
-            <a:p>
-              <a:pPr algn="ctr">
-                <a:defRPr>
-                  <a:solidFill>
-                    <a:srgbClr val="FFFFFF"/>
-                  </a:solidFill>
-                </a:defRPr>
-              </a:pPr>
-              <a:endParaRPr/>
-            </a:p>
-          </p:txBody>
-        </p:sp>
-        <p:sp>
-          <p:nvSpPr>
-            <p:cNvPr id="401" name="figures"/>
-            <p:cNvSpPr txBox="1"/>
-            <p:nvPr/>
-          </p:nvSpPr>
-          <p:spPr>
-            <a:xfrm>
-              <a:off x="-1" y="1331590"/>
-              <a:ext cx="6364678" cy="875986"/>
-            </a:xfrm>
-            <a:prstGeom prst="rect">
-              <a:avLst/>
-            </a:prstGeom>
-            <a:noFill/>
-            <a:ln w="3175" cap="flat">
-              <a:noFill/>
-              <a:miter lim="400000"/>
-            </a:ln>
-            <a:effectLst/>
-            <a:extLst>
-              <a:ext uri="{C572A759-6A51-4108-AA02-DFA0A04FC94B}">
-                <ma14:wrappingTextBoxFlag xmlns:ma14="http://schemas.microsoft.com/office/mac/drawingml/2011/main" xmlns:a14="http://schemas.microsoft.com/office/drawing/2010/main" xmlns:m="http://schemas.openxmlformats.org/officeDocument/2006/math" xmlns="" val="1"/>
-              </a:ext>
-            </a:extLst>
-          </p:spPr>
-          <p:txBody>
-            <a:bodyPr wrap="square" lIns="22277" tIns="22277" rIns="22277" bIns="22277" numCol="1" anchor="ctr">
-              <a:spAutoFit/>
-            </a:bodyPr>
-            <a:lstStyle>
-              <a:lvl1pPr algn="ctr">
-                <a:defRPr sz="5400">
-                  <a:solidFill>
-                    <a:srgbClr val="FFFFFF"/>
-                  </a:solidFill>
-                  <a:latin typeface="Arial"/>
-                  <a:ea typeface="Arial"/>
-                  <a:cs typeface="Arial"/>
-                  <a:sym typeface="Arial"/>
-                </a:defRPr>
-              </a:lvl1pPr>
-            </a:lstStyle>
-            <a:p>
-              <a:r>
-                <a:t>figures</a:t>
-              </a:r>
-            </a:p>
-          </p:txBody>
-        </p:sp>
-      </p:grpSp>
       <p:grpSp>
         <p:nvGrpSpPr>
           <p:cNvPr id="405" name="Rectangle 41"/>
@@ -11266,7 +10600,7 @@
             <a:effectLst/>
             <a:extLst>
               <a:ext uri="{C572A759-6A51-4108-AA02-DFA0A04FC94B}">
-                <ma14:wrappingTextBoxFlag xmlns:ma14="http://schemas.microsoft.com/office/mac/drawingml/2011/main" xmlns:a14="http://schemas.microsoft.com/office/drawing/2010/main" xmlns:m="http://schemas.openxmlformats.org/officeDocument/2006/math" xmlns="" val="1"/>
+                <ma14:wrappingTextBoxFlag xmlns="" xmlns:m="http://schemas.openxmlformats.org/officeDocument/2006/math" xmlns:a14="http://schemas.microsoft.com/office/drawing/2010/main" xmlns:ma14="http://schemas.microsoft.com/office/mac/drawingml/2011/main" val="1"/>
               </a:ext>
             </a:extLst>
           </p:spPr>
@@ -11371,7 +10705,7 @@
             <a:effectLst/>
             <a:extLst>
               <a:ext uri="{C572A759-6A51-4108-AA02-DFA0A04FC94B}">
-                <ma14:wrappingTextBoxFlag xmlns:ma14="http://schemas.microsoft.com/office/mac/drawingml/2011/main" xmlns:a14="http://schemas.microsoft.com/office/drawing/2010/main" xmlns:m="http://schemas.openxmlformats.org/officeDocument/2006/math" xmlns="" val="1"/>
+                <ma14:wrappingTextBoxFlag xmlns="" xmlns:m="http://schemas.openxmlformats.org/officeDocument/2006/math" xmlns:a14="http://schemas.microsoft.com/office/drawing/2010/main" xmlns:ma14="http://schemas.microsoft.com/office/mac/drawingml/2011/main" val="1"/>
               </a:ext>
             </a:extLst>
           </p:spPr>
@@ -11419,7 +10753,7 @@
           </a:ln>
           <a:extLst>
             <a:ext uri="{C572A759-6A51-4108-AA02-DFA0A04FC94B}">
-              <ma14:wrappingTextBoxFlag xmlns:ma14="http://schemas.microsoft.com/office/mac/drawingml/2011/main" xmlns:a14="http://schemas.microsoft.com/office/drawing/2010/main" xmlns:m="http://schemas.openxmlformats.org/officeDocument/2006/math" xmlns="" val="1"/>
+              <ma14:wrappingTextBoxFlag xmlns="" xmlns:m="http://schemas.openxmlformats.org/officeDocument/2006/math" xmlns:a14="http://schemas.microsoft.com/office/drawing/2010/main" xmlns:ma14="http://schemas.microsoft.com/office/mac/drawingml/2011/main" val="1"/>
             </a:ext>
           </a:extLst>
         </p:spPr>
@@ -11464,7 +10798,7 @@
           </a:ln>
           <a:extLst>
             <a:ext uri="{C572A759-6A51-4108-AA02-DFA0A04FC94B}">
-              <ma14:wrappingTextBoxFlag xmlns:ma14="http://schemas.microsoft.com/office/mac/drawingml/2011/main" xmlns:a14="http://schemas.microsoft.com/office/drawing/2010/main" xmlns:m="http://schemas.openxmlformats.org/officeDocument/2006/math" xmlns="" val="1"/>
+              <ma14:wrappingTextBoxFlag xmlns="" xmlns:m="http://schemas.openxmlformats.org/officeDocument/2006/math" xmlns:a14="http://schemas.microsoft.com/office/drawing/2010/main" xmlns:ma14="http://schemas.microsoft.com/office/mac/drawingml/2011/main" val="1"/>
             </a:ext>
           </a:extLst>
         </p:spPr>
@@ -11490,321 +10824,6 @@
           </a:p>
         </p:txBody>
       </p:sp>
-      <p:grpSp>
-        <p:nvGrpSpPr>
-          <p:cNvPr id="413" name="Rectangle 36"/>
-          <p:cNvGrpSpPr/>
-          <p:nvPr/>
-        </p:nvGrpSpPr>
-        <p:grpSpPr>
-          <a:xfrm>
-            <a:off x="7509471" y="25276342"/>
-            <a:ext cx="2956500" cy="1650219"/>
-            <a:chOff x="-1" y="-1"/>
-            <a:chExt cx="2956498" cy="1650218"/>
-          </a:xfrm>
-        </p:grpSpPr>
-        <p:sp>
-          <p:nvSpPr>
-            <p:cNvPr id="411" name="Rectangle"/>
-            <p:cNvSpPr/>
-            <p:nvPr/>
-          </p:nvSpPr>
-          <p:spPr>
-            <a:xfrm>
-              <a:off x="-1" y="-1"/>
-              <a:ext cx="2956498" cy="1650218"/>
-            </a:xfrm>
-            <a:prstGeom prst="rect">
-              <a:avLst/>
-            </a:prstGeom>
-            <a:solidFill>
-              <a:srgbClr val="DBDBDB"/>
-            </a:solidFill>
-            <a:ln w="12700" cap="flat">
-              <a:noFill/>
-              <a:miter lim="400000"/>
-            </a:ln>
-            <a:effectLst/>
-          </p:spPr>
-          <p:txBody>
-            <a:bodyPr wrap="square" lIns="22277" tIns="22277" rIns="22277" bIns="22277" numCol="1" anchor="ctr">
-              <a:noAutofit/>
-            </a:bodyPr>
-            <a:lstStyle/>
-            <a:p>
-              <a:pPr algn="ctr">
-                <a:defRPr>
-                  <a:solidFill>
-                    <a:srgbClr val="FFFFFF"/>
-                  </a:solidFill>
-                </a:defRPr>
-              </a:pPr>
-              <a:endParaRPr/>
-            </a:p>
-          </p:txBody>
-        </p:sp>
-        <p:sp>
-          <p:nvSpPr>
-            <p:cNvPr id="412" name="figures"/>
-            <p:cNvSpPr txBox="1"/>
-            <p:nvPr/>
-          </p:nvSpPr>
-          <p:spPr>
-            <a:xfrm>
-              <a:off x="-1" y="387116"/>
-              <a:ext cx="2956498" cy="875985"/>
-            </a:xfrm>
-            <a:prstGeom prst="rect">
-              <a:avLst/>
-            </a:prstGeom>
-            <a:noFill/>
-            <a:ln w="3175" cap="flat">
-              <a:noFill/>
-              <a:miter lim="400000"/>
-            </a:ln>
-            <a:effectLst/>
-            <a:extLst>
-              <a:ext uri="{C572A759-6A51-4108-AA02-DFA0A04FC94B}">
-                <ma14:wrappingTextBoxFlag xmlns:ma14="http://schemas.microsoft.com/office/mac/drawingml/2011/main" xmlns:a14="http://schemas.microsoft.com/office/drawing/2010/main" xmlns:m="http://schemas.openxmlformats.org/officeDocument/2006/math" xmlns="" val="1"/>
-              </a:ext>
-            </a:extLst>
-          </p:spPr>
-          <p:txBody>
-            <a:bodyPr wrap="square" lIns="22277" tIns="22277" rIns="22277" bIns="22277" numCol="1" anchor="ctr">
-              <a:spAutoFit/>
-            </a:bodyPr>
-            <a:lstStyle>
-              <a:lvl1pPr algn="ctr">
-                <a:defRPr sz="5400">
-                  <a:solidFill>
-                    <a:srgbClr val="FFFFFF"/>
-                  </a:solidFill>
-                  <a:latin typeface="Arial"/>
-                  <a:ea typeface="Arial"/>
-                  <a:cs typeface="Arial"/>
-                  <a:sym typeface="Arial"/>
-                </a:defRPr>
-              </a:lvl1pPr>
-            </a:lstStyle>
-            <a:p>
-              <a:r>
-                <a:t>figures</a:t>
-              </a:r>
-            </a:p>
-          </p:txBody>
-        </p:sp>
-      </p:grpSp>
-      <p:grpSp>
-        <p:nvGrpSpPr>
-          <p:cNvPr id="416" name="Rectangle 41"/>
-          <p:cNvGrpSpPr/>
-          <p:nvPr/>
-        </p:nvGrpSpPr>
-        <p:grpSpPr>
-          <a:xfrm>
-            <a:off x="7509473" y="22516920"/>
-            <a:ext cx="6364679" cy="2697951"/>
-            <a:chOff x="0" y="0"/>
-            <a:chExt cx="6364678" cy="2697950"/>
-          </a:xfrm>
-        </p:grpSpPr>
-        <p:sp>
-          <p:nvSpPr>
-            <p:cNvPr id="414" name="Rectangle"/>
-            <p:cNvSpPr/>
-            <p:nvPr/>
-          </p:nvSpPr>
-          <p:spPr>
-            <a:xfrm>
-              <a:off x="0" y="0"/>
-              <a:ext cx="6364678" cy="2697950"/>
-            </a:xfrm>
-            <a:prstGeom prst="rect">
-              <a:avLst/>
-            </a:prstGeom>
-            <a:solidFill>
-              <a:srgbClr val="DBDBDB"/>
-            </a:solidFill>
-            <a:ln w="12700" cap="flat">
-              <a:noFill/>
-              <a:miter lim="400000"/>
-            </a:ln>
-            <a:effectLst/>
-          </p:spPr>
-          <p:txBody>
-            <a:bodyPr wrap="square" lIns="22277" tIns="22277" rIns="22277" bIns="22277" numCol="1" anchor="ctr">
-              <a:noAutofit/>
-            </a:bodyPr>
-            <a:lstStyle/>
-            <a:p>
-              <a:pPr algn="ctr">
-                <a:defRPr>
-                  <a:solidFill>
-                    <a:srgbClr val="FFFFFF"/>
-                  </a:solidFill>
-                </a:defRPr>
-              </a:pPr>
-              <a:endParaRPr/>
-            </a:p>
-          </p:txBody>
-        </p:sp>
-        <p:sp>
-          <p:nvSpPr>
-            <p:cNvPr id="415" name="figures"/>
-            <p:cNvSpPr txBox="1"/>
-            <p:nvPr/>
-          </p:nvSpPr>
-          <p:spPr>
-            <a:xfrm>
-              <a:off x="0" y="910982"/>
-              <a:ext cx="6364678" cy="875986"/>
-            </a:xfrm>
-            <a:prstGeom prst="rect">
-              <a:avLst/>
-            </a:prstGeom>
-            <a:noFill/>
-            <a:ln w="3175" cap="flat">
-              <a:noFill/>
-              <a:miter lim="400000"/>
-            </a:ln>
-            <a:effectLst/>
-            <a:extLst>
-              <a:ext uri="{C572A759-6A51-4108-AA02-DFA0A04FC94B}">
-                <ma14:wrappingTextBoxFlag xmlns:ma14="http://schemas.microsoft.com/office/mac/drawingml/2011/main" xmlns:a14="http://schemas.microsoft.com/office/drawing/2010/main" xmlns:m="http://schemas.openxmlformats.org/officeDocument/2006/math" xmlns="" val="1"/>
-              </a:ext>
-            </a:extLst>
-          </p:spPr>
-          <p:txBody>
-            <a:bodyPr wrap="square" lIns="22277" tIns="22277" rIns="22277" bIns="22277" numCol="1" anchor="ctr">
-              <a:spAutoFit/>
-            </a:bodyPr>
-            <a:lstStyle>
-              <a:lvl1pPr algn="ctr">
-                <a:defRPr sz="5400">
-                  <a:solidFill>
-                    <a:srgbClr val="FFFFFF"/>
-                  </a:solidFill>
-                  <a:latin typeface="Arial"/>
-                  <a:ea typeface="Arial"/>
-                  <a:cs typeface="Arial"/>
-                  <a:sym typeface="Arial"/>
-                </a:defRPr>
-              </a:lvl1pPr>
-            </a:lstStyle>
-            <a:p>
-              <a:r>
-                <a:t>figures</a:t>
-              </a:r>
-            </a:p>
-          </p:txBody>
-        </p:sp>
-      </p:grpSp>
-      <p:grpSp>
-        <p:nvGrpSpPr>
-          <p:cNvPr id="419" name="Rectangle 42"/>
-          <p:cNvGrpSpPr/>
-          <p:nvPr/>
-        </p:nvGrpSpPr>
-        <p:grpSpPr>
-          <a:xfrm>
-            <a:off x="10917652" y="25276342"/>
-            <a:ext cx="2956499" cy="1650219"/>
-            <a:chOff x="-1" y="-1"/>
-            <a:chExt cx="2956498" cy="1650218"/>
-          </a:xfrm>
-        </p:grpSpPr>
-        <p:sp>
-          <p:nvSpPr>
-            <p:cNvPr id="417" name="Rectangle"/>
-            <p:cNvSpPr/>
-            <p:nvPr/>
-          </p:nvSpPr>
-          <p:spPr>
-            <a:xfrm>
-              <a:off x="-1" y="-1"/>
-              <a:ext cx="2956498" cy="1650218"/>
-            </a:xfrm>
-            <a:prstGeom prst="rect">
-              <a:avLst/>
-            </a:prstGeom>
-            <a:solidFill>
-              <a:srgbClr val="DBDBDB"/>
-            </a:solidFill>
-            <a:ln w="12700" cap="flat">
-              <a:noFill/>
-              <a:miter lim="400000"/>
-            </a:ln>
-            <a:effectLst/>
-          </p:spPr>
-          <p:txBody>
-            <a:bodyPr wrap="square" lIns="22277" tIns="22277" rIns="22277" bIns="22277" numCol="1" anchor="ctr">
-              <a:noAutofit/>
-            </a:bodyPr>
-            <a:lstStyle/>
-            <a:p>
-              <a:pPr algn="ctr">
-                <a:defRPr>
-                  <a:solidFill>
-                    <a:srgbClr val="FFFFFF"/>
-                  </a:solidFill>
-                </a:defRPr>
-              </a:pPr>
-              <a:endParaRPr/>
-            </a:p>
-          </p:txBody>
-        </p:sp>
-        <p:sp>
-          <p:nvSpPr>
-            <p:cNvPr id="418" name="figures"/>
-            <p:cNvSpPr txBox="1"/>
-            <p:nvPr/>
-          </p:nvSpPr>
-          <p:spPr>
-            <a:xfrm>
-              <a:off x="-1" y="387116"/>
-              <a:ext cx="2956498" cy="875985"/>
-            </a:xfrm>
-            <a:prstGeom prst="rect">
-              <a:avLst/>
-            </a:prstGeom>
-            <a:noFill/>
-            <a:ln w="3175" cap="flat">
-              <a:noFill/>
-              <a:miter lim="400000"/>
-            </a:ln>
-            <a:effectLst/>
-            <a:extLst>
-              <a:ext uri="{C572A759-6A51-4108-AA02-DFA0A04FC94B}">
-                <ma14:wrappingTextBoxFlag xmlns:ma14="http://schemas.microsoft.com/office/mac/drawingml/2011/main" xmlns:a14="http://schemas.microsoft.com/office/drawing/2010/main" xmlns:m="http://schemas.openxmlformats.org/officeDocument/2006/math" xmlns="" val="1"/>
-              </a:ext>
-            </a:extLst>
-          </p:spPr>
-          <p:txBody>
-            <a:bodyPr wrap="square" lIns="22277" tIns="22277" rIns="22277" bIns="22277" numCol="1" anchor="ctr">
-              <a:spAutoFit/>
-            </a:bodyPr>
-            <a:lstStyle>
-              <a:lvl1pPr algn="ctr">
-                <a:defRPr sz="5400">
-                  <a:solidFill>
-                    <a:srgbClr val="FFFFFF"/>
-                  </a:solidFill>
-                  <a:latin typeface="Arial"/>
-                  <a:ea typeface="Arial"/>
-                  <a:cs typeface="Arial"/>
-                  <a:sym typeface="Arial"/>
-                </a:defRPr>
-              </a:lvl1pPr>
-            </a:lstStyle>
-            <a:p>
-              <a:r>
-                <a:t>figures</a:t>
-              </a:r>
-            </a:p>
-          </p:txBody>
-        </p:sp>
-      </p:grpSp>
       <p:pic>
         <p:nvPicPr>
           <p:cNvPr id="3" name="Picture 2" descr="Logo&#10;&#10;Description automatically generated">
@@ -11865,7 +10884,7 @@
           </a:ln>
           <a:extLst>
             <a:ext uri="{C572A759-6A51-4108-AA02-DFA0A04FC94B}">
-              <ma14:wrappingTextBoxFlag xmlns:ma14="http://schemas.microsoft.com/office/mac/drawingml/2011/main" xmlns:a14="http://schemas.microsoft.com/office/drawing/2010/main" xmlns:m="http://schemas.openxmlformats.org/officeDocument/2006/math" xmlns="" val="1"/>
+              <ma14:wrappingTextBoxFlag xmlns="" xmlns:m="http://schemas.openxmlformats.org/officeDocument/2006/math" xmlns:a14="http://schemas.microsoft.com/office/drawing/2010/main" xmlns:ma14="http://schemas.microsoft.com/office/mac/drawingml/2011/main" val="1"/>
             </a:ext>
           </a:extLst>
         </p:spPr>
@@ -11927,12 +10946,108 @@
           </a:prstGeom>
         </p:spPr>
       </p:pic>
+      <p:sp>
+        <p:nvSpPr>
+          <p:cNvPr id="2" name="TextBox 1">
+            <a:extLst>
+              <a:ext uri="{FF2B5EF4-FFF2-40B4-BE49-F238E27FC236}">
+                <a16:creationId xmlns:a16="http://schemas.microsoft.com/office/drawing/2014/main" id="{777E86C4-EA51-CB52-4AEC-1E76B592364E}"/>
+              </a:ext>
+            </a:extLst>
+          </p:cNvPr>
+          <p:cNvSpPr txBox="1"/>
+          <p:nvPr/>
+        </p:nvSpPr>
+        <p:spPr>
+          <a:xfrm>
+            <a:off x="571599" y="10988679"/>
+            <a:ext cx="6364677" cy="3645975"/>
+          </a:xfrm>
+          <a:prstGeom prst="rect">
+            <a:avLst/>
+          </a:prstGeom>
+          <a:noFill/>
+          <a:ln w="3175" cap="flat">
+            <a:noFill/>
+            <a:miter lim="400000"/>
+          </a:ln>
+          <a:effectLst/>
+          <a:sp3d/>
+        </p:spPr>
+        <p:style>
+          <a:lnRef idx="0">
+            <a:scrgbClr r="0" g="0" b="0"/>
+          </a:lnRef>
+          <a:fillRef idx="0">
+            <a:scrgbClr r="0" g="0" b="0"/>
+          </a:fillRef>
+          <a:effectRef idx="0">
+            <a:scrgbClr r="0" g="0" b="0"/>
+          </a:effectRef>
+          <a:fontRef idx="none"/>
+        </p:style>
+        <p:txBody>
+          <a:bodyPr rot="0" spcFirstLastPara="1" vertOverflow="overflow" horzOverflow="overflow" vert="horz" wrap="square" lIns="22277" tIns="22277" rIns="22277" bIns="22277" numCol="1" spcCol="38100" rtlCol="0" anchor="t">
+            <a:spAutoFit/>
+          </a:bodyPr>
+          <a:lstStyle/>
+          <a:p>
+            <a:pPr algn="just">
+              <a:defRPr sz="2400">
+                <a:latin typeface="Arial"/>
+                <a:ea typeface="Arial"/>
+                <a:cs typeface="Arial"/>
+                <a:sym typeface="Arial"/>
+              </a:defRPr>
+            </a:pPr>
+            <a:r>
+              <a:rPr lang="en-GB" sz="2400" dirty="0">
+                <a:latin typeface="Arial"/>
+                <a:cs typeface="Arial"/>
+              </a:rPr>
+              <a:t>The project is still in its early stages though, and Jo is looking to continue expanding the app. Among the ideas presented for expanding and improving the site, the accessibility of it as well as its security stood out as the most important things that we should be looking at to tackle. </a:t>
+            </a:r>
+          </a:p>
+          <a:p>
+            <a:pPr marL="0" marR="0" indent="0" algn="l" defTabSz="3446207" rtl="0" fontAlgn="auto" latinLnBrk="0" hangingPunct="0">
+              <a:lnSpc>
+                <a:spcPct val="100000"/>
+              </a:lnSpc>
+              <a:spcBef>
+                <a:spcPts val="0"/>
+              </a:spcBef>
+              <a:spcAft>
+                <a:spcPts val="0"/>
+              </a:spcAft>
+              <a:buClrTx/>
+              <a:buSzTx/>
+              <a:buFontTx/>
+              <a:buNone/>
+              <a:tabLst/>
+            </a:pPr>
+            <a:endParaRPr kumimoji="0" lang="en-GB" sz="6600" b="0" i="0" u="none" strike="noStrike" cap="none" spc="0" normalizeH="0" baseline="0" dirty="0">
+              <a:ln>
+                <a:noFill/>
+              </a:ln>
+              <a:solidFill>
+                <a:srgbClr val="000000"/>
+              </a:solidFill>
+              <a:effectLst/>
+              <a:uFillTx/>
+              <a:latin typeface="+mn-lt"/>
+              <a:ea typeface="+mn-ea"/>
+              <a:cs typeface="+mn-cs"/>
+              <a:sym typeface="Calibri"/>
+            </a:endParaRPr>
+          </a:p>
+        </p:txBody>
+      </p:sp>
       <p:pic>
         <p:nvPicPr>
-          <p:cNvPr id="7" name="Picture 6" descr="A long loaf of bread&#10;&#10;Description automatically generated">
+          <p:cNvPr id="10" name="Picture 9" descr="A screenshot of a computer&#10;&#10;Description automatically generated">
             <a:extLst>
               <a:ext uri="{FF2B5EF4-FFF2-40B4-BE49-F238E27FC236}">
-                <a16:creationId xmlns:a16="http://schemas.microsoft.com/office/drawing/2014/main" id="{72019906-254E-AF3E-05BD-8BC10775E77D}"/>
+                <a16:creationId xmlns:a16="http://schemas.microsoft.com/office/drawing/2014/main" id="{8446E1F2-6AED-D9EA-E08D-6CD6A81C3767}"/>
               </a:ext>
             </a:extLst>
           </p:cNvPr>
@@ -11942,7 +11057,7 @@
           <p:nvPr/>
         </p:nvPicPr>
         <p:blipFill>
-          <a:blip r:embed="rId4">
+          <a:blip r:embed="rId4" cstate="print">
             <a:extLst>
               <a:ext uri="{28A0092B-C50C-407E-A947-70E740481C1C}">
                 <a14:useLocalDpi xmlns:a14="http://schemas.microsoft.com/office/drawing/2010/main" val="0"/>
@@ -11955,80 +11070,8 @@
         </p:blipFill>
         <p:spPr>
           <a:xfrm>
-            <a:off x="8818373" y="15300572"/>
-            <a:ext cx="3295196" cy="1959259"/>
-          </a:xfrm>
-          <a:prstGeom prst="rect">
-            <a:avLst/>
-          </a:prstGeom>
-        </p:spPr>
-      </p:pic>
-      <p:pic>
-        <p:nvPicPr>
-          <p:cNvPr id="9" name="Picture 8" descr="A loaf of bread with butter on a wooden board&#10;&#10;Description automatically generated">
-            <a:extLst>
-              <a:ext uri="{FF2B5EF4-FFF2-40B4-BE49-F238E27FC236}">
-                <a16:creationId xmlns:a16="http://schemas.microsoft.com/office/drawing/2014/main" id="{64427BC8-4CD7-DC82-22D1-9BD8573B8FEA}"/>
-              </a:ext>
-            </a:extLst>
-          </p:cNvPr>
-          <p:cNvPicPr>
-            <a:picLocks noChangeAspect="1"/>
-          </p:cNvPicPr>
-          <p:nvPr/>
-        </p:nvPicPr>
-        <p:blipFill>
-          <a:blip r:embed="rId5">
-            <a:extLst>
-              <a:ext uri="{28A0092B-C50C-407E-A947-70E740481C1C}">
-                <a14:useLocalDpi xmlns:a14="http://schemas.microsoft.com/office/drawing/2010/main" val="0"/>
-              </a:ext>
-            </a:extLst>
-          </a:blip>
-          <a:stretch>
-            <a:fillRect/>
-          </a:stretch>
-        </p:blipFill>
-        <p:spPr>
-          <a:xfrm>
-            <a:off x="8734577" y="22652304"/>
-            <a:ext cx="3958687" cy="3958687"/>
-          </a:xfrm>
-          <a:prstGeom prst="rect">
-            <a:avLst/>
-          </a:prstGeom>
-        </p:spPr>
-      </p:pic>
-      <p:pic>
-        <p:nvPicPr>
-          <p:cNvPr id="11" name="Picture 10" descr="A loaf of bread on a cutting board&#10;&#10;Description automatically generated">
-            <a:extLst>
-              <a:ext uri="{FF2B5EF4-FFF2-40B4-BE49-F238E27FC236}">
-                <a16:creationId xmlns:a16="http://schemas.microsoft.com/office/drawing/2014/main" id="{AEC29887-C76A-7CCB-AE5A-3EE14DBF689B}"/>
-              </a:ext>
-            </a:extLst>
-          </p:cNvPr>
-          <p:cNvPicPr>
-            <a:picLocks noChangeAspect="1"/>
-          </p:cNvPicPr>
-          <p:nvPr/>
-        </p:nvPicPr>
-        <p:blipFill>
-          <a:blip r:embed="rId6">
-            <a:extLst>
-              <a:ext uri="{28A0092B-C50C-407E-A947-70E740481C1C}">
-                <a14:useLocalDpi xmlns:a14="http://schemas.microsoft.com/office/drawing/2010/main" val="0"/>
-              </a:ext>
-            </a:extLst>
-          </a:blip>
-          <a:stretch>
-            <a:fillRect/>
-          </a:stretch>
-        </p:blipFill>
-        <p:spPr>
-          <a:xfrm>
-            <a:off x="1041392" y="23027794"/>
-            <a:ext cx="5425096" cy="4068822"/>
+            <a:off x="784194" y="20499617"/>
+            <a:ext cx="13042350" cy="7102957"/>
           </a:xfrm>
           <a:prstGeom prst="rect">
             <a:avLst/>

</xml_diff>

<commit_message>
Added a bit more for technical
</commit_message>
<xml_diff>
--- a/Breadbox Poster.pptx
+++ b/Breadbox Poster.pptx
@@ -6508,7 +6508,7 @@
           </a:ln>
           <a:extLst>
             <a:ext uri="{C572A759-6A51-4108-AA02-DFA0A04FC94B}">
-              <ma14:wrappingTextBoxFlag xmlns="" xmlns:m="http://schemas.openxmlformats.org/officeDocument/2006/math" xmlns:a14="http://schemas.microsoft.com/office/drawing/2010/main" xmlns:ma14="http://schemas.microsoft.com/office/mac/drawingml/2011/main" val="1"/>
+              <ma14:wrappingTextBoxFlag xmlns:ma14="http://schemas.microsoft.com/office/mac/drawingml/2011/main" xmlns:a14="http://schemas.microsoft.com/office/drawing/2010/main" xmlns:m="http://schemas.openxmlformats.org/officeDocument/2006/math" xmlns="" val="1"/>
             </a:ext>
           </a:extLst>
         </p:spPr>
@@ -6545,7 +6545,7 @@
           </a:ln>
           <a:extLst>
             <a:ext uri="{C572A759-6A51-4108-AA02-DFA0A04FC94B}">
-              <ma14:wrappingTextBoxFlag xmlns="" xmlns:m="http://schemas.openxmlformats.org/officeDocument/2006/math" xmlns:a14="http://schemas.microsoft.com/office/drawing/2010/main" xmlns:ma14="http://schemas.microsoft.com/office/mac/drawingml/2011/main" val="1"/>
+              <ma14:wrappingTextBoxFlag xmlns:ma14="http://schemas.microsoft.com/office/mac/drawingml/2011/main" xmlns:a14="http://schemas.microsoft.com/office/drawing/2010/main" xmlns:m="http://schemas.openxmlformats.org/officeDocument/2006/math" xmlns="" val="1"/>
             </a:ext>
           </a:extLst>
         </p:spPr>
@@ -7555,7 +7555,7 @@
             <a:effectLst/>
             <a:extLst>
               <a:ext uri="{C572A759-6A51-4108-AA02-DFA0A04FC94B}">
-                <ma14:wrappingTextBoxFlag xmlns="" xmlns:m="http://schemas.openxmlformats.org/officeDocument/2006/math" xmlns:a14="http://schemas.microsoft.com/office/drawing/2010/main" xmlns:ma14="http://schemas.microsoft.com/office/mac/drawingml/2011/main" val="1"/>
+                <ma14:wrappingTextBoxFlag xmlns:ma14="http://schemas.microsoft.com/office/mac/drawingml/2011/main" xmlns:a14="http://schemas.microsoft.com/office/drawing/2010/main" xmlns:m="http://schemas.openxmlformats.org/officeDocument/2006/math" xmlns="" val="1"/>
               </a:ext>
             </a:extLst>
           </p:spPr>
@@ -7666,7 +7666,7 @@
             <a:effectLst/>
             <a:extLst>
               <a:ext uri="{C572A759-6A51-4108-AA02-DFA0A04FC94B}">
-                <ma14:wrappingTextBoxFlag xmlns="" xmlns:m="http://schemas.openxmlformats.org/officeDocument/2006/math" xmlns:a14="http://schemas.microsoft.com/office/drawing/2010/main" xmlns:ma14="http://schemas.microsoft.com/office/mac/drawingml/2011/main" val="1"/>
+                <ma14:wrappingTextBoxFlag xmlns:ma14="http://schemas.microsoft.com/office/mac/drawingml/2011/main" xmlns:a14="http://schemas.microsoft.com/office/drawing/2010/main" xmlns:m="http://schemas.openxmlformats.org/officeDocument/2006/math" xmlns="" val="1"/>
               </a:ext>
             </a:extLst>
           </p:spPr>
@@ -7777,7 +7777,7 @@
             <a:effectLst/>
             <a:extLst>
               <a:ext uri="{C572A759-6A51-4108-AA02-DFA0A04FC94B}">
-                <ma14:wrappingTextBoxFlag xmlns="" xmlns:m="http://schemas.openxmlformats.org/officeDocument/2006/math" xmlns:a14="http://schemas.microsoft.com/office/drawing/2010/main" xmlns:ma14="http://schemas.microsoft.com/office/mac/drawingml/2011/main" val="1"/>
+                <ma14:wrappingTextBoxFlag xmlns:ma14="http://schemas.microsoft.com/office/mac/drawingml/2011/main" xmlns:a14="http://schemas.microsoft.com/office/drawing/2010/main" xmlns:m="http://schemas.openxmlformats.org/officeDocument/2006/math" xmlns="" val="1"/>
               </a:ext>
             </a:extLst>
           </p:spPr>
@@ -7888,7 +7888,7 @@
             <a:effectLst/>
             <a:extLst>
               <a:ext uri="{C572A759-6A51-4108-AA02-DFA0A04FC94B}">
-                <ma14:wrappingTextBoxFlag xmlns="" xmlns:m="http://schemas.openxmlformats.org/officeDocument/2006/math" xmlns:a14="http://schemas.microsoft.com/office/drawing/2010/main" xmlns:ma14="http://schemas.microsoft.com/office/mac/drawingml/2011/main" val="1"/>
+                <ma14:wrappingTextBoxFlag xmlns:ma14="http://schemas.microsoft.com/office/mac/drawingml/2011/main" xmlns:a14="http://schemas.microsoft.com/office/drawing/2010/main" xmlns:m="http://schemas.openxmlformats.org/officeDocument/2006/math" xmlns="" val="1"/>
               </a:ext>
             </a:extLst>
           </p:spPr>
@@ -7999,7 +7999,7 @@
             <a:effectLst/>
             <a:extLst>
               <a:ext uri="{C572A759-6A51-4108-AA02-DFA0A04FC94B}">
-                <ma14:wrappingTextBoxFlag xmlns="" xmlns:m="http://schemas.openxmlformats.org/officeDocument/2006/math" xmlns:a14="http://schemas.microsoft.com/office/drawing/2010/main" xmlns:ma14="http://schemas.microsoft.com/office/mac/drawingml/2011/main" val="1"/>
+                <ma14:wrappingTextBoxFlag xmlns:ma14="http://schemas.microsoft.com/office/mac/drawingml/2011/main" xmlns:a14="http://schemas.microsoft.com/office/drawing/2010/main" xmlns:m="http://schemas.openxmlformats.org/officeDocument/2006/math" xmlns="" val="1"/>
               </a:ext>
             </a:extLst>
           </p:spPr>
@@ -8054,7 +8054,7 @@
           </a:ln>
           <a:extLst>
             <a:ext uri="{C572A759-6A51-4108-AA02-DFA0A04FC94B}">
-              <ma14:wrappingTextBoxFlag xmlns="" xmlns:m="http://schemas.openxmlformats.org/officeDocument/2006/math" xmlns:a14="http://schemas.microsoft.com/office/drawing/2010/main" xmlns:ma14="http://schemas.microsoft.com/office/mac/drawingml/2011/main" val="1"/>
+              <ma14:wrappingTextBoxFlag xmlns:ma14="http://schemas.microsoft.com/office/mac/drawingml/2011/main" xmlns:a14="http://schemas.microsoft.com/office/drawing/2010/main" xmlns:m="http://schemas.openxmlformats.org/officeDocument/2006/math" xmlns="" val="1"/>
             </a:ext>
           </a:extLst>
         </p:spPr>
@@ -8805,7 +8805,7 @@
           </a:ln>
           <a:extLst>
             <a:ext uri="{C572A759-6A51-4108-AA02-DFA0A04FC94B}">
-              <ma14:wrappingTextBoxFlag xmlns="" xmlns:m="http://schemas.openxmlformats.org/officeDocument/2006/math" xmlns:a14="http://schemas.microsoft.com/office/drawing/2010/main" xmlns:ma14="http://schemas.microsoft.com/office/mac/drawingml/2011/main" val="1"/>
+              <ma14:wrappingTextBoxFlag xmlns:ma14="http://schemas.microsoft.com/office/mac/drawingml/2011/main" xmlns:a14="http://schemas.microsoft.com/office/drawing/2010/main" xmlns:m="http://schemas.openxmlformats.org/officeDocument/2006/math" xmlns="" val="1"/>
             </a:ext>
           </a:extLst>
         </p:spPr>
@@ -9707,7 +9707,7 @@
           </a:ln>
           <a:extLst>
             <a:ext uri="{C572A759-6A51-4108-AA02-DFA0A04FC94B}">
-              <ma14:wrappingTextBoxFlag xmlns="" xmlns:m="http://schemas.openxmlformats.org/officeDocument/2006/math" xmlns:a14="http://schemas.microsoft.com/office/drawing/2010/main" xmlns:ma14="http://schemas.microsoft.com/office/mac/drawingml/2011/main" val="1"/>
+              <ma14:wrappingTextBoxFlag xmlns:ma14="http://schemas.microsoft.com/office/mac/drawingml/2011/main" xmlns:a14="http://schemas.microsoft.com/office/drawing/2010/main" xmlns:m="http://schemas.openxmlformats.org/officeDocument/2006/math" xmlns="" val="1"/>
             </a:ext>
           </a:extLst>
         </p:spPr>
@@ -9740,7 +9740,7 @@
         </p:nvSpPr>
         <p:spPr>
           <a:xfrm>
-            <a:off x="623302" y="16226329"/>
+            <a:off x="623302" y="16022645"/>
             <a:ext cx="6364677" cy="4476972"/>
           </a:xfrm>
           <a:prstGeom prst="rect">
@@ -9756,7 +9756,7 @@
           </a:ln>
           <a:extLst>
             <a:ext uri="{C572A759-6A51-4108-AA02-DFA0A04FC94B}">
-              <ma14:wrappingTextBoxFlag xmlns="" xmlns:m="http://schemas.openxmlformats.org/officeDocument/2006/math" xmlns:a14="http://schemas.microsoft.com/office/drawing/2010/main" xmlns:ma14="http://schemas.microsoft.com/office/mac/drawingml/2011/main" val="1"/>
+              <ma14:wrappingTextBoxFlag xmlns:ma14="http://schemas.microsoft.com/office/mac/drawingml/2011/main" xmlns:a14="http://schemas.microsoft.com/office/drawing/2010/main" xmlns:m="http://schemas.openxmlformats.org/officeDocument/2006/math" xmlns="" val="1"/>
             </a:ext>
           </a:extLst>
         </p:spPr>
@@ -9823,7 +9823,7 @@
           </a:ln>
           <a:extLst>
             <a:ext uri="{C572A759-6A51-4108-AA02-DFA0A04FC94B}">
-              <ma14:wrappingTextBoxFlag xmlns="" xmlns:m="http://schemas.openxmlformats.org/officeDocument/2006/math" xmlns:a14="http://schemas.microsoft.com/office/drawing/2010/main" xmlns:ma14="http://schemas.microsoft.com/office/mac/drawingml/2011/main" val="1"/>
+              <ma14:wrappingTextBoxFlag xmlns:ma14="http://schemas.microsoft.com/office/mac/drawingml/2011/main" xmlns:a14="http://schemas.microsoft.com/office/drawing/2010/main" xmlns:m="http://schemas.openxmlformats.org/officeDocument/2006/math" xmlns="" val="1"/>
             </a:ext>
           </a:extLst>
         </p:spPr>
@@ -9927,7 +9927,7 @@
             <a:effectLst/>
             <a:extLst>
               <a:ext uri="{C572A759-6A51-4108-AA02-DFA0A04FC94B}">
-                <ma14:wrappingTextBoxFlag xmlns="" xmlns:m="http://schemas.openxmlformats.org/officeDocument/2006/math" xmlns:a14="http://schemas.microsoft.com/office/drawing/2010/main" xmlns:ma14="http://schemas.microsoft.com/office/mac/drawingml/2011/main" val="1"/>
+                <ma14:wrappingTextBoxFlag xmlns:ma14="http://schemas.microsoft.com/office/mac/drawingml/2011/main" xmlns:a14="http://schemas.microsoft.com/office/drawing/2010/main" xmlns:m="http://schemas.openxmlformats.org/officeDocument/2006/math" xmlns="" val="1"/>
               </a:ext>
             </a:extLst>
           </p:spPr>
@@ -9965,7 +9965,7 @@
         <p:spPr>
           <a:xfrm>
             <a:off x="7561166" y="15207792"/>
-            <a:ext cx="6364678" cy="4846303"/>
+            <a:ext cx="6364678" cy="2630312"/>
           </a:xfrm>
           <a:prstGeom prst="rect">
             <a:avLst/>
@@ -9980,7 +9980,7 @@
           </a:ln>
           <a:extLst>
             <a:ext uri="{C572A759-6A51-4108-AA02-DFA0A04FC94B}">
-              <ma14:wrappingTextBoxFlag xmlns="" xmlns:m="http://schemas.openxmlformats.org/officeDocument/2006/math" xmlns:a14="http://schemas.microsoft.com/office/drawing/2010/main" xmlns:ma14="http://schemas.microsoft.com/office/mac/drawingml/2011/main" val="1"/>
+              <ma14:wrappingTextBoxFlag xmlns:ma14="http://schemas.microsoft.com/office/mac/drawingml/2011/main" xmlns:a14="http://schemas.microsoft.com/office/drawing/2010/main" xmlns:m="http://schemas.openxmlformats.org/officeDocument/2006/math" xmlns="" val="1"/>
             </a:ext>
           </a:extLst>
         </p:spPr>
@@ -10001,526 +10001,9 @@
           <a:p>
             <a:pPr algn="just"/>
             <a:r>
-              <a:rPr dirty="0"/>
-              <a:t>As </a:t>
-            </a:r>
-            <a:r>
-              <a:rPr dirty="0" err="1"/>
-              <a:t>verepe</a:t>
-            </a:r>
-            <a:r>
-              <a:rPr dirty="0"/>
-              <a:t> </a:t>
-            </a:r>
-            <a:r>
-              <a:rPr dirty="0" err="1"/>
-              <a:t>sectis</a:t>
-            </a:r>
-            <a:r>
-              <a:rPr dirty="0"/>
-              <a:t> </a:t>
-            </a:r>
-            <a:r>
-              <a:rPr dirty="0" err="1"/>
-              <a:t>enda</a:t>
-            </a:r>
-            <a:r>
-              <a:rPr dirty="0"/>
-              <a:t> di </a:t>
-            </a:r>
-            <a:r>
-              <a:rPr dirty="0" err="1"/>
-              <a:t>incto</a:t>
-            </a:r>
-            <a:r>
-              <a:rPr dirty="0"/>
-              <a:t> </a:t>
-            </a:r>
-            <a:r>
-              <a:rPr dirty="0" err="1"/>
-              <a:t>etusda</a:t>
-            </a:r>
-            <a:r>
-              <a:rPr dirty="0"/>
-              <a:t> </a:t>
-            </a:r>
-            <a:r>
-              <a:rPr dirty="0" err="1"/>
-              <a:t>delectet</a:t>
-            </a:r>
-            <a:r>
-              <a:rPr dirty="0"/>
-              <a:t> </a:t>
-            </a:r>
-            <a:r>
-              <a:rPr dirty="0" err="1"/>
-              <a:t>eaque</a:t>
-            </a:r>
-            <a:r>
-              <a:rPr dirty="0"/>
-              <a:t> </a:t>
-            </a:r>
-            <a:r>
-              <a:rPr dirty="0" err="1"/>
-              <a:t>simusda</a:t>
-            </a:r>
-            <a:r>
-              <a:rPr dirty="0"/>
-              <a:t> </a:t>
-            </a:r>
-            <a:r>
-              <a:rPr dirty="0" err="1"/>
-              <a:t>ndanimus</a:t>
-            </a:r>
-            <a:r>
-              <a:rPr dirty="0"/>
-              <a:t>, sin </a:t>
-            </a:r>
-            <a:r>
-              <a:rPr dirty="0" err="1"/>
-              <a:t>cori</a:t>
-            </a:r>
-            <a:r>
-              <a:rPr dirty="0"/>
-              <a:t> rem id </a:t>
-            </a:r>
-            <a:r>
-              <a:rPr dirty="0" err="1"/>
-              <a:t>maximillut</a:t>
-            </a:r>
-            <a:r>
-              <a:rPr dirty="0"/>
-              <a:t> </a:t>
-            </a:r>
-            <a:r>
-              <a:rPr dirty="0" err="1"/>
-              <a:t>hari</a:t>
-            </a:r>
-            <a:r>
-              <a:rPr dirty="0"/>
-              <a:t> con </a:t>
-            </a:r>
-            <a:r>
-              <a:rPr dirty="0" err="1"/>
-              <a:t>ea</a:t>
-            </a:r>
-            <a:r>
-              <a:rPr dirty="0"/>
-              <a:t> </a:t>
-            </a:r>
-            <a:r>
-              <a:rPr dirty="0" err="1"/>
-              <a:t>quiam</a:t>
-            </a:r>
-            <a:r>
-              <a:rPr dirty="0"/>
-              <a:t> </a:t>
-            </a:r>
-            <a:r>
-              <a:rPr dirty="0" err="1"/>
-              <a:t>quam</a:t>
-            </a:r>
-            <a:r>
-              <a:rPr dirty="0"/>
-              <a:t> et </a:t>
-            </a:r>
-            <a:r>
-              <a:rPr dirty="0" err="1"/>
-              <a:t>enduci</a:t>
-            </a:r>
-            <a:r>
-              <a:rPr dirty="0"/>
-              <a:t> </a:t>
-            </a:r>
-            <a:r>
-              <a:rPr dirty="0" err="1"/>
-              <a:t>idunt</a:t>
-            </a:r>
-            <a:r>
-              <a:rPr dirty="0"/>
-              <a:t>, </a:t>
-            </a:r>
-            <a:r>
-              <a:rPr dirty="0" err="1"/>
-              <a:t>corecta</a:t>
-            </a:r>
-            <a:r>
-              <a:rPr dirty="0"/>
-              <a:t> </a:t>
-            </a:r>
-            <a:r>
-              <a:rPr dirty="0" err="1"/>
-              <a:t>alicimp</a:t>
-            </a:r>
-            <a:r>
-              <a:rPr dirty="0"/>
-              <a:t> </a:t>
-            </a:r>
-            <a:r>
-              <a:rPr dirty="0" err="1"/>
-              <a:t>oriaeperum</a:t>
-            </a:r>
-            <a:r>
-              <a:rPr dirty="0"/>
-              <a:t> </a:t>
-            </a:r>
-            <a:r>
-              <a:rPr dirty="0" err="1"/>
-              <a:t>iusaeped</a:t>
-            </a:r>
-            <a:r>
-              <a:rPr dirty="0"/>
-              <a:t> </a:t>
-            </a:r>
-            <a:r>
-              <a:rPr dirty="0" err="1"/>
-              <a:t>unt</a:t>
-            </a:r>
-            <a:r>
-              <a:rPr dirty="0"/>
-              <a:t> </a:t>
-            </a:r>
-            <a:r>
-              <a:rPr dirty="0" err="1"/>
-              <a:t>quis</a:t>
-            </a:r>
-            <a:r>
-              <a:rPr dirty="0"/>
-              <a:t> et </a:t>
-            </a:r>
-            <a:r>
-              <a:rPr dirty="0" err="1"/>
-              <a:t>ut</a:t>
-            </a:r>
-            <a:r>
-              <a:rPr dirty="0"/>
-              <a:t> </a:t>
-            </a:r>
-            <a:r>
-              <a:rPr dirty="0" err="1"/>
-              <a:t>abor</a:t>
-            </a:r>
-            <a:r>
-              <a:rPr dirty="0"/>
-              <a:t> </a:t>
-            </a:r>
-            <a:r>
-              <a:rPr dirty="0" err="1"/>
-              <a:t>ame</a:t>
-            </a:r>
-            <a:r>
-              <a:rPr dirty="0"/>
-              <a:t> </a:t>
-            </a:r>
-            <a:r>
-              <a:rPr dirty="0" err="1"/>
-              <a:t>alis</a:t>
-            </a:r>
-            <a:r>
-              <a:rPr dirty="0"/>
-              <a:t> </a:t>
-            </a:r>
-            <a:r>
-              <a:rPr dirty="0" err="1"/>
-              <a:t>utatur</a:t>
-            </a:r>
-            <a:r>
-              <a:rPr dirty="0"/>
-              <a:t> as senet a </a:t>
-            </a:r>
-            <a:r>
-              <a:rPr dirty="0" err="1"/>
-              <a:t>quibus</a:t>
-            </a:r>
-            <a:r>
-              <a:rPr dirty="0"/>
-              <a:t> </a:t>
-            </a:r>
-            <a:r>
-              <a:rPr dirty="0" err="1"/>
-              <a:t>dolutatur</a:t>
-            </a:r>
-            <a:r>
-              <a:rPr dirty="0"/>
-              <a:t> </a:t>
-            </a:r>
-            <a:r>
-              <a:rPr dirty="0" err="1"/>
-              <a:t>sedit</a:t>
-            </a:r>
-            <a:r>
-              <a:rPr dirty="0"/>
-              <a:t> </a:t>
-            </a:r>
-            <a:r>
-              <a:rPr dirty="0" err="1"/>
-              <a:t>aliam</a:t>
-            </a:r>
-            <a:r>
-              <a:rPr dirty="0"/>
-              <a:t> </a:t>
-            </a:r>
-            <a:r>
-              <a:rPr dirty="0" err="1"/>
-              <a:t>apienda</a:t>
-            </a:r>
-            <a:r>
-              <a:rPr dirty="0"/>
-              <a:t> </a:t>
-            </a:r>
-            <a:r>
-              <a:rPr dirty="0" err="1"/>
-              <a:t>versper</a:t>
-            </a:r>
-            <a:r>
-              <a:rPr dirty="0"/>
-              <a:t> </a:t>
-            </a:r>
-            <a:r>
-              <a:rPr dirty="0" err="1"/>
-              <a:t>feriti</a:t>
-            </a:r>
-            <a:r>
-              <a:rPr dirty="0"/>
-              <a:t> </a:t>
-            </a:r>
-            <a:r>
-              <a:rPr dirty="0" err="1"/>
-              <a:t>delia</a:t>
-            </a:r>
-            <a:r>
-              <a:rPr dirty="0"/>
-              <a:t> pa </a:t>
-            </a:r>
-            <a:r>
-              <a:rPr dirty="0" err="1"/>
-              <a:t>dolo</a:t>
-            </a:r>
-            <a:r>
-              <a:rPr dirty="0"/>
-              <a:t> </a:t>
-            </a:r>
-            <a:r>
-              <a:rPr dirty="0" err="1"/>
-              <a:t>quamus</a:t>
-            </a:r>
-            <a:r>
-              <a:rPr dirty="0"/>
-              <a:t> arum es </a:t>
-            </a:r>
-            <a:r>
-              <a:rPr dirty="0" err="1"/>
-              <a:t>endellu</a:t>
-            </a:r>
-            <a:r>
-              <a:rPr dirty="0"/>
-              <a:t> </a:t>
-            </a:r>
-            <a:r>
-              <a:rPr dirty="0" err="1"/>
-              <a:t>pisquia</a:t>
-            </a:r>
-            <a:r>
-              <a:rPr dirty="0"/>
-              <a:t> </a:t>
-            </a:r>
-            <a:r>
-              <a:rPr dirty="0" err="1"/>
-              <a:t>aditatur</a:t>
-            </a:r>
-            <a:r>
-              <a:rPr dirty="0"/>
-              <a:t> </a:t>
-            </a:r>
-            <a:r>
-              <a:rPr dirty="0" err="1"/>
-              <a:t>audam</a:t>
-            </a:r>
-            <a:r>
-              <a:rPr dirty="0"/>
-              <a:t> </a:t>
-            </a:r>
-            <a:r>
-              <a:rPr dirty="0" err="1"/>
-              <a:t>earupid</a:t>
-            </a:r>
-            <a:r>
-              <a:rPr dirty="0"/>
-              <a:t> quo </a:t>
-            </a:r>
-            <a:r>
-              <a:rPr dirty="0" err="1"/>
-              <a:t>quunt</a:t>
-            </a:r>
-            <a:r>
-              <a:rPr dirty="0"/>
-              <a:t> </a:t>
-            </a:r>
-            <a:r>
-              <a:rPr dirty="0" err="1"/>
-              <a:t>odigniscil</a:t>
-            </a:r>
-            <a:r>
-              <a:rPr dirty="0"/>
-              <a:t> </a:t>
-            </a:r>
-            <a:r>
-              <a:rPr dirty="0" err="1"/>
-              <a:t>earum</a:t>
-            </a:r>
-            <a:r>
-              <a:rPr dirty="0"/>
-              <a:t> </a:t>
-            </a:r>
-            <a:r>
-              <a:rPr dirty="0" err="1"/>
-              <a:t>verios</a:t>
-            </a:r>
-            <a:r>
-              <a:rPr dirty="0"/>
-              <a:t> </a:t>
-            </a:r>
-            <a:r>
-              <a:rPr dirty="0" err="1"/>
-              <a:t>nonsequam</a:t>
-            </a:r>
-            <a:r>
-              <a:rPr dirty="0"/>
-              <a:t> </a:t>
-            </a:r>
-            <a:r>
-              <a:rPr dirty="0" err="1"/>
-              <a:t>duciis</a:t>
-            </a:r>
-            <a:r>
-              <a:rPr dirty="0"/>
-              <a:t> et </a:t>
-            </a:r>
-            <a:r>
-              <a:rPr dirty="0" err="1"/>
-              <a:t>apienda</a:t>
-            </a:r>
-            <a:r>
-              <a:rPr dirty="0"/>
-              <a:t> </a:t>
-            </a:r>
-            <a:r>
-              <a:rPr dirty="0" err="1"/>
-              <a:t>versper</a:t>
-            </a:r>
-            <a:r>
-              <a:rPr dirty="0"/>
-              <a:t> </a:t>
-            </a:r>
-            <a:r>
-              <a:rPr dirty="0" err="1"/>
-              <a:t>feriti</a:t>
-            </a:r>
-            <a:r>
-              <a:rPr dirty="0"/>
-              <a:t> </a:t>
-            </a:r>
-            <a:r>
-              <a:rPr dirty="0" err="1"/>
-              <a:t>delia</a:t>
-            </a:r>
-            <a:r>
-              <a:rPr dirty="0"/>
-              <a:t> pa </a:t>
-            </a:r>
-            <a:r>
-              <a:rPr dirty="0" err="1"/>
-              <a:t>dolo</a:t>
-            </a:r>
-            <a:r>
-              <a:rPr dirty="0"/>
-              <a:t> </a:t>
-            </a:r>
-            <a:r>
-              <a:rPr dirty="0" err="1"/>
-              <a:t>quamus</a:t>
-            </a:r>
-            <a:r>
-              <a:rPr dirty="0"/>
-              <a:t> arum es </a:t>
-            </a:r>
-            <a:r>
-              <a:rPr dirty="0" err="1"/>
-              <a:t>endellu</a:t>
-            </a:r>
-            <a:r>
-              <a:rPr dirty="0"/>
-              <a:t> </a:t>
-            </a:r>
-            <a:r>
-              <a:rPr dirty="0" err="1"/>
-              <a:t>pisquia</a:t>
-            </a:r>
-            <a:r>
-              <a:rPr dirty="0"/>
-              <a:t> </a:t>
-            </a:r>
-            <a:r>
-              <a:rPr dirty="0" err="1"/>
-              <a:t>aditatur</a:t>
-            </a:r>
-            <a:r>
-              <a:rPr dirty="0"/>
-              <a:t> </a:t>
-            </a:r>
-            <a:r>
-              <a:rPr dirty="0" err="1"/>
-              <a:t>audam</a:t>
-            </a:r>
-            <a:r>
-              <a:rPr dirty="0"/>
-              <a:t> </a:t>
-            </a:r>
-            <a:r>
-              <a:rPr dirty="0" err="1"/>
-              <a:t>earupid</a:t>
-            </a:r>
-            <a:r>
-              <a:rPr dirty="0"/>
-              <a:t> quo </a:t>
-            </a:r>
-            <a:r>
-              <a:rPr dirty="0" err="1"/>
-              <a:t>quunt</a:t>
-            </a:r>
-            <a:r>
-              <a:rPr dirty="0"/>
-              <a:t> </a:t>
-            </a:r>
-            <a:r>
-              <a:rPr dirty="0" err="1"/>
-              <a:t>odigniscil</a:t>
-            </a:r>
-            <a:r>
-              <a:rPr dirty="0"/>
-              <a:t> </a:t>
-            </a:r>
-            <a:r>
-              <a:rPr dirty="0" err="1"/>
-              <a:t>earum</a:t>
-            </a:r>
-            <a:r>
-              <a:rPr dirty="0"/>
-              <a:t> </a:t>
-            </a:r>
-            <a:r>
-              <a:rPr dirty="0" err="1"/>
-              <a:t>verios</a:t>
-            </a:r>
-            <a:r>
-              <a:rPr dirty="0"/>
-              <a:t> </a:t>
-            </a:r>
-            <a:r>
-              <a:rPr dirty="0" err="1"/>
-              <a:t>nonsequam</a:t>
-            </a:r>
-            <a:endParaRPr dirty="0"/>
+              <a:rPr lang="en-GB" dirty="0"/>
+              <a:t>We then created front end web pages based on our Figma prototype using HMTL, JavaScript and CSS. The accessibility features were added using JavaScript functions tied to buttons, normally using the onclick() method to trigger a change to the browsers local CSS file. </a:t>
+            </a:r>
           </a:p>
         </p:txBody>
       </p:sp>
@@ -10600,7 +10083,7 @@
             <a:effectLst/>
             <a:extLst>
               <a:ext uri="{C572A759-6A51-4108-AA02-DFA0A04FC94B}">
-                <ma14:wrappingTextBoxFlag xmlns="" xmlns:m="http://schemas.openxmlformats.org/officeDocument/2006/math" xmlns:a14="http://schemas.microsoft.com/office/drawing/2010/main" xmlns:ma14="http://schemas.microsoft.com/office/mac/drawingml/2011/main" val="1"/>
+                <ma14:wrappingTextBoxFlag xmlns:ma14="http://schemas.microsoft.com/office/mac/drawingml/2011/main" xmlns:a14="http://schemas.microsoft.com/office/drawing/2010/main" xmlns:m="http://schemas.openxmlformats.org/officeDocument/2006/math" xmlns="" val="1"/>
               </a:ext>
             </a:extLst>
           </p:spPr>
@@ -10705,7 +10188,7 @@
             <a:effectLst/>
             <a:extLst>
               <a:ext uri="{C572A759-6A51-4108-AA02-DFA0A04FC94B}">
-                <ma14:wrappingTextBoxFlag xmlns="" xmlns:m="http://schemas.openxmlformats.org/officeDocument/2006/math" xmlns:a14="http://schemas.microsoft.com/office/drawing/2010/main" xmlns:ma14="http://schemas.microsoft.com/office/mac/drawingml/2011/main" val="1"/>
+                <ma14:wrappingTextBoxFlag xmlns:ma14="http://schemas.microsoft.com/office/mac/drawingml/2011/main" xmlns:a14="http://schemas.microsoft.com/office/drawing/2010/main" xmlns:m="http://schemas.openxmlformats.org/officeDocument/2006/math" xmlns="" val="1"/>
               </a:ext>
             </a:extLst>
           </p:spPr>
@@ -10753,7 +10236,7 @@
           </a:ln>
           <a:extLst>
             <a:ext uri="{C572A759-6A51-4108-AA02-DFA0A04FC94B}">
-              <ma14:wrappingTextBoxFlag xmlns="" xmlns:m="http://schemas.openxmlformats.org/officeDocument/2006/math" xmlns:a14="http://schemas.microsoft.com/office/drawing/2010/main" xmlns:ma14="http://schemas.microsoft.com/office/mac/drawingml/2011/main" val="1"/>
+              <ma14:wrappingTextBoxFlag xmlns:ma14="http://schemas.microsoft.com/office/mac/drawingml/2011/main" xmlns:a14="http://schemas.microsoft.com/office/drawing/2010/main" xmlns:m="http://schemas.openxmlformats.org/officeDocument/2006/math" xmlns="" val="1"/>
             </a:ext>
           </a:extLst>
         </p:spPr>
@@ -10798,7 +10281,7 @@
           </a:ln>
           <a:extLst>
             <a:ext uri="{C572A759-6A51-4108-AA02-DFA0A04FC94B}">
-              <ma14:wrappingTextBoxFlag xmlns="" xmlns:m="http://schemas.openxmlformats.org/officeDocument/2006/math" xmlns:a14="http://schemas.microsoft.com/office/drawing/2010/main" xmlns:ma14="http://schemas.microsoft.com/office/mac/drawingml/2011/main" val="1"/>
+              <ma14:wrappingTextBoxFlag xmlns:ma14="http://schemas.microsoft.com/office/mac/drawingml/2011/main" xmlns:a14="http://schemas.microsoft.com/office/drawing/2010/main" xmlns:m="http://schemas.openxmlformats.org/officeDocument/2006/math" xmlns="" val="1"/>
             </a:ext>
           </a:extLst>
         </p:spPr>
@@ -10884,7 +10367,7 @@
           </a:ln>
           <a:extLst>
             <a:ext uri="{C572A759-6A51-4108-AA02-DFA0A04FC94B}">
-              <ma14:wrappingTextBoxFlag xmlns="" xmlns:m="http://schemas.openxmlformats.org/officeDocument/2006/math" xmlns:a14="http://schemas.microsoft.com/office/drawing/2010/main" xmlns:ma14="http://schemas.microsoft.com/office/mac/drawingml/2011/main" val="1"/>
+              <ma14:wrappingTextBoxFlag xmlns:ma14="http://schemas.microsoft.com/office/mac/drawingml/2011/main" xmlns:a14="http://schemas.microsoft.com/office/drawing/2010/main" xmlns:m="http://schemas.openxmlformats.org/officeDocument/2006/math" xmlns="" val="1"/>
             </a:ext>
           </a:extLst>
         </p:spPr>

</xml_diff>